<commit_message>
Update Alex Bangs - Poster Current Draft.pptx
</commit_message>
<xml_diff>
--- a/Poster Files/Alex Bangs - Poster Current Draft.pptx
+++ b/Poster Files/Alex Bangs - Poster Current Draft.pptx
@@ -242,6 +242,15 @@
     </a:lvl9pPr>
   </p:defaultTextStyle>
   <p:extLst>
+    <p:ext uri="{521415D9-36F7-43E2-AB2F-B90AF26B5E84}">
+      <p14:sectionLst xmlns:p14="http://schemas.microsoft.com/office/powerpoint/2010/main">
+        <p14:section name="Untitled Section" id="{7D9FE6F5-5364-4438-88DD-886FE2CDFA83}">
+          <p14:sldIdLst>
+            <p14:sldId id="256"/>
+          </p14:sldIdLst>
+        </p14:section>
+      </p14:sectionLst>
+    </p:ext>
     <p:ext uri="{EFAFB233-063F-42B5-8137-9DF3F51BA10A}">
       <p15:sldGuideLst xmlns:p15="http://schemas.microsoft.com/office/powerpoint/2012/main">
         <p15:guide id="1" orient="horz" pos="10368">
@@ -260,7 +269,7 @@
       <p15:notesGuideLst xmlns:p15="http://schemas.microsoft.com/office/powerpoint/2012/main"/>
     </p:ext>
     <p:ext uri="http://customooxmlschemas.google.com/">
-      <go:slidesCustomData xmlns:go="http://customooxmlschemas.google.com/" xmlns:ahyp="http://schemas.microsoft.com/office/drawing/2018/hyperlinkcolor" xmlns:p15="http://schemas.microsoft.com/office/powerpoint/2012/main" xmlns:p14="http://schemas.microsoft.com/office/powerpoint/2010/main" xmlns:com="http://schemas.openxmlformats.org/drawingml/2006/compatibility" xmlns:pvml="urn:schemas-microsoft-com:office:powerpoint" xmlns:v="urn:schemas-microsoft-com:vml" xmlns:o="urn:schemas-microsoft-com:office:office" xmlns:dgm="http://schemas.openxmlformats.org/drawingml/2006/diagram" xmlns:c="http://schemas.openxmlformats.org/drawingml/2006/chart" xmlns:mv="urn:schemas-microsoft-com:mac:vml" xmlns:mc="http://schemas.openxmlformats.org/markup-compatibility/2006" xmlns="" r:id="rId8" roundtripDataSignature="AMtx7mi/h82vb4vaiyJxrkkTqy2IKs11OQ=="/>
+      <go:slidesCustomData xmlns="" xmlns:mc="http://schemas.openxmlformats.org/markup-compatibility/2006" xmlns:mv="urn:schemas-microsoft-com:mac:vml" xmlns:c="http://schemas.openxmlformats.org/drawingml/2006/chart" xmlns:dgm="http://schemas.openxmlformats.org/drawingml/2006/diagram" xmlns:o="urn:schemas-microsoft-com:office:office" xmlns:v="urn:schemas-microsoft-com:vml" xmlns:pvml="urn:schemas-microsoft-com:office:powerpoint" xmlns:com="http://schemas.openxmlformats.org/drawingml/2006/compatibility" xmlns:p14="http://schemas.microsoft.com/office/powerpoint/2010/main" xmlns:p15="http://schemas.microsoft.com/office/powerpoint/2012/main" xmlns:ahyp="http://schemas.microsoft.com/office/drawing/2018/hyperlinkcolor" xmlns:go="http://customooxmlschemas.google.com/" r:id="rId8" roundtripDataSignature="AMtx7mi/h82vb4vaiyJxrkkTqy2IKs11OQ=="/>
     </p:ext>
   </p:extLst>
 </p:presentation>
@@ -19895,36 +19904,170 @@
           <a:chExt cx="0" cy="0"/>
         </a:xfrm>
       </p:grpSpPr>
-      <p:pic>
-        <p:nvPicPr>
-          <p:cNvPr id="206" name="Picture 205" descr="A red and white map&#10;&#10;Description automatically generated">
+      <p:cxnSp>
+        <p:nvCxnSpPr>
+          <p:cNvPr id="25" name="Google Shape;98;p1">
             <a:extLst>
               <a:ext uri="{FF2B5EF4-FFF2-40B4-BE49-F238E27FC236}">
-                <a16:creationId xmlns:a16="http://schemas.microsoft.com/office/drawing/2014/main" id="{ED3AD138-2F0F-F5E5-B991-C862CC38757D}"/>
+                <a16:creationId xmlns:a16="http://schemas.microsoft.com/office/drawing/2014/main" id="{4C1337A3-BBFD-5B2C-00AF-35D9573EF437}"/>
               </a:ext>
             </a:extLst>
           </p:cNvPr>
-          <p:cNvPicPr>
-            <a:picLocks noChangeAspect="1"/>
-          </p:cNvPicPr>
+          <p:cNvCxnSpPr>
+            <a:cxnSpLocks/>
+          </p:cNvCxnSpPr>
           <p:nvPr/>
-        </p:nvPicPr>
-        <p:blipFill>
-          <a:blip r:embed="rId3"/>
-          <a:stretch>
-            <a:fillRect/>
-          </a:stretch>
-        </p:blipFill>
+        </p:nvCxnSpPr>
         <p:spPr>
-          <a:xfrm>
-            <a:off x="37828724" y="8531079"/>
-            <a:ext cx="5833872" cy="5833872"/>
+          <a:xfrm rot="5400000">
+            <a:off x="34471190" y="8990557"/>
+            <a:ext cx="457200" cy="0"/>
           </a:xfrm>
-          <a:prstGeom prst="rect">
+          <a:prstGeom prst="straightConnector1">
             <a:avLst/>
           </a:prstGeom>
+          <a:noFill/>
+          <a:ln w="12700" cap="flat" cmpd="sng">
+            <a:solidFill>
+              <a:schemeClr val="dk1"/>
+            </a:solidFill>
+            <a:prstDash val="solid"/>
+            <a:round/>
+            <a:headEnd type="none" w="sm" len="sm"/>
+            <a:tailEnd type="none" w="sm" len="sm"/>
+          </a:ln>
+          <a:effectLst>
+            <a:outerShdw blurRad="40000" dist="20000" dir="5400000" rotWithShape="0">
+              <a:srgbClr val="000000">
+                <a:alpha val="36470"/>
+              </a:srgbClr>
+            </a:outerShdw>
+          </a:effectLst>
         </p:spPr>
-      </p:pic>
+      </p:cxnSp>
+      <p:cxnSp>
+        <p:nvCxnSpPr>
+          <p:cNvPr id="29" name="Google Shape;98;p1">
+            <a:extLst>
+              <a:ext uri="{FF2B5EF4-FFF2-40B4-BE49-F238E27FC236}">
+                <a16:creationId xmlns:a16="http://schemas.microsoft.com/office/drawing/2014/main" id="{4D345503-8AE5-4EA8-C8A1-A272B88BF8BC}"/>
+              </a:ext>
+            </a:extLst>
+          </p:cNvPr>
+          <p:cNvCxnSpPr>
+            <a:cxnSpLocks/>
+          </p:cNvCxnSpPr>
+          <p:nvPr/>
+        </p:nvCxnSpPr>
+        <p:spPr>
+          <a:xfrm rot="5400000">
+            <a:off x="40511881" y="8990557"/>
+            <a:ext cx="457200" cy="0"/>
+          </a:xfrm>
+          <a:prstGeom prst="straightConnector1">
+            <a:avLst/>
+          </a:prstGeom>
+          <a:noFill/>
+          <a:ln w="12700" cap="flat" cmpd="sng">
+            <a:solidFill>
+              <a:schemeClr val="dk1"/>
+            </a:solidFill>
+            <a:prstDash val="solid"/>
+            <a:round/>
+            <a:headEnd type="none" w="sm" len="sm"/>
+            <a:tailEnd type="none" w="sm" len="sm"/>
+          </a:ln>
+          <a:effectLst>
+            <a:outerShdw blurRad="40000" dist="20000" dir="5400000" rotWithShape="0">
+              <a:srgbClr val="000000">
+                <a:alpha val="36470"/>
+              </a:srgbClr>
+            </a:outerShdw>
+          </a:effectLst>
+        </p:spPr>
+      </p:cxnSp>
+      <p:cxnSp>
+        <p:nvCxnSpPr>
+          <p:cNvPr id="23" name="Google Shape;98;p1">
+            <a:extLst>
+              <a:ext uri="{FF2B5EF4-FFF2-40B4-BE49-F238E27FC236}">
+                <a16:creationId xmlns:a16="http://schemas.microsoft.com/office/drawing/2014/main" id="{F235E7E4-E44E-B32E-C564-DC6E3EA700B1}"/>
+              </a:ext>
+            </a:extLst>
+          </p:cNvPr>
+          <p:cNvCxnSpPr>
+            <a:cxnSpLocks/>
+          </p:cNvCxnSpPr>
+          <p:nvPr/>
+        </p:nvCxnSpPr>
+        <p:spPr>
+          <a:xfrm rot="5400000">
+            <a:off x="21877875" y="29059639"/>
+            <a:ext cx="0" cy="457200"/>
+          </a:xfrm>
+          <a:prstGeom prst="straightConnector1">
+            <a:avLst/>
+          </a:prstGeom>
+          <a:noFill/>
+          <a:ln w="12700" cap="flat" cmpd="sng">
+            <a:solidFill>
+              <a:schemeClr val="dk1"/>
+            </a:solidFill>
+            <a:prstDash val="solid"/>
+            <a:round/>
+            <a:headEnd type="none" w="sm" len="sm"/>
+            <a:tailEnd type="none" w="sm" len="sm"/>
+          </a:ln>
+          <a:effectLst>
+            <a:outerShdw blurRad="40000" dist="20000" dir="5400000" rotWithShape="0">
+              <a:srgbClr val="000000">
+                <a:alpha val="36470"/>
+              </a:srgbClr>
+            </a:outerShdw>
+          </a:effectLst>
+        </p:spPr>
+      </p:cxnSp>
+      <p:cxnSp>
+        <p:nvCxnSpPr>
+          <p:cNvPr id="20" name="Google Shape;98;p1">
+            <a:extLst>
+              <a:ext uri="{FF2B5EF4-FFF2-40B4-BE49-F238E27FC236}">
+                <a16:creationId xmlns:a16="http://schemas.microsoft.com/office/drawing/2014/main" id="{F1F199A0-CA19-F9FD-DF5E-2F0D93622C40}"/>
+              </a:ext>
+            </a:extLst>
+          </p:cNvPr>
+          <p:cNvCxnSpPr>
+            <a:cxnSpLocks/>
+          </p:cNvCxnSpPr>
+          <p:nvPr/>
+        </p:nvCxnSpPr>
+        <p:spPr>
+          <a:xfrm rot="5400000">
+            <a:off x="16973559" y="21000890"/>
+            <a:ext cx="457200" cy="0"/>
+          </a:xfrm>
+          <a:prstGeom prst="straightConnector1">
+            <a:avLst/>
+          </a:prstGeom>
+          <a:noFill/>
+          <a:ln w="12700" cap="flat" cmpd="sng">
+            <a:solidFill>
+              <a:schemeClr val="dk1"/>
+            </a:solidFill>
+            <a:prstDash val="solid"/>
+            <a:round/>
+            <a:headEnd type="none" w="sm" len="sm"/>
+            <a:tailEnd type="none" w="sm" len="sm"/>
+          </a:ln>
+          <a:effectLst>
+            <a:outerShdw blurRad="40000" dist="20000" dir="5400000" rotWithShape="0">
+              <a:srgbClr val="000000">
+                <a:alpha val="36470"/>
+              </a:srgbClr>
+            </a:outerShdw>
+          </a:effectLst>
+        </p:spPr>
+      </p:cxnSp>
       <p:cxnSp>
         <p:nvCxnSpPr>
           <p:cNvPr id="219" name="Google Shape;98;p1">
@@ -20558,7 +20701,7 @@
             <p:nvPr/>
           </p:nvPicPr>
           <p:blipFill rotWithShape="1">
-            <a:blip r:embed="rId4"/>
+            <a:blip r:embed="rId3"/>
             <a:srcRect l="36237" t="4333" b="-75"/>
             <a:stretch/>
           </p:blipFill>
@@ -20677,7 +20820,7 @@
           <p:nvPr/>
         </p:nvPicPr>
         <p:blipFill>
-          <a:blip r:embed="rId5"/>
+          <a:blip r:embed="rId4"/>
           <a:srcRect l="7353" r="5862"/>
           <a:stretch/>
         </p:blipFill>
@@ -21041,7 +21184,7 @@
                 <a:cs typeface="Arial"/>
                 <a:sym typeface="Arial"/>
               </a:rPr>
-              <a:t>1</a:t>
+              <a:t>1,2</a:t>
             </a:r>
             <a:r>
               <a:rPr lang="en-US" sz="5000" i="0" u="none" strike="noStrike" cap="none" dirty="0">
@@ -21065,7 +21208,7 @@
                 <a:cs typeface="Arial"/>
                 <a:sym typeface="Arial"/>
               </a:rPr>
-              <a:t>1,2</a:t>
+              <a:t>1,3</a:t>
             </a:r>
             <a:endParaRPr sz="5000" i="0" u="none" strike="noStrike" cap="none" dirty="0">
               <a:solidFill>
@@ -21129,7 +21272,31 @@
                 <a:cs typeface="Arial"/>
                 <a:sym typeface="Arial"/>
               </a:rPr>
-              <a:t>2 </a:t>
+              <a:t>2</a:t>
+            </a:r>
+            <a:r>
+              <a:rPr lang="en-US" sz="3200" i="0" u="none" strike="noStrike" cap="none" dirty="0">
+                <a:solidFill>
+                  <a:schemeClr val="dk1"/>
+                </a:solidFill>
+                <a:latin typeface="Arial"/>
+                <a:ea typeface="Arial"/>
+                <a:cs typeface="Arial"/>
+                <a:sym typeface="Arial"/>
+              </a:rPr>
+              <a:t>a</a:t>
+            </a:r>
+            <a:r>
+              <a:rPr lang="en-US" sz="3200" i="0" u="none" strike="noStrike" cap="none" baseline="30000" dirty="0">
+                <a:solidFill>
+                  <a:schemeClr val="dk1"/>
+                </a:solidFill>
+                <a:latin typeface="Arial"/>
+                <a:ea typeface="Arial"/>
+                <a:cs typeface="Arial"/>
+                <a:sym typeface="Arial"/>
+              </a:rPr>
+              <a:t> </a:t>
             </a:r>
             <a:r>
               <a:rPr lang="en-US" sz="3200" i="0" u="none" strike="noStrike" cap="none" dirty="0">
@@ -21169,7 +21336,7 @@
           <p:nvPr/>
         </p:nvPicPr>
         <p:blipFill>
-          <a:blip r:embed="rId6"/>
+          <a:blip r:embed="rId5"/>
           <a:srcRect t="1" b="15698"/>
           <a:stretch/>
         </p:blipFill>
@@ -21241,7 +21408,7 @@
           <p:nvPr/>
         </p:nvPicPr>
         <p:blipFill rotWithShape="1">
-          <a:blip r:embed="rId7"/>
+          <a:blip r:embed="rId6"/>
           <a:srcRect r="297"/>
           <a:stretch/>
         </p:blipFill>
@@ -21399,10 +21566,10 @@
       </p:sp>
       <p:grpSp>
         <p:nvGrpSpPr>
-          <p:cNvPr id="220" name="Group 219">
+          <p:cNvPr id="158" name="Group 157">
             <a:extLst>
               <a:ext uri="{FF2B5EF4-FFF2-40B4-BE49-F238E27FC236}">
-                <a16:creationId xmlns:a16="http://schemas.microsoft.com/office/drawing/2014/main" id="{6CA89709-F71B-8E3C-5412-FEBBA9620998}"/>
+                <a16:creationId xmlns:a16="http://schemas.microsoft.com/office/drawing/2014/main" id="{808CCF02-E6C6-E681-D019-5CCB1524E8FB}"/>
               </a:ext>
             </a:extLst>
           </p:cNvPr>
@@ -21411,95 +21578,56 @@
         </p:nvGrpSpPr>
         <p:grpSpPr>
           <a:xfrm>
-            <a:off x="31546800" y="24250656"/>
-            <a:ext cx="12344400" cy="4428310"/>
-            <a:chOff x="31546800" y="24460200"/>
-            <a:chExt cx="12344400" cy="4218765"/>
+            <a:off x="31768534" y="24499964"/>
+            <a:ext cx="11887200" cy="4303638"/>
+            <a:chOff x="31953484" y="26517599"/>
+            <a:chExt cx="11887200" cy="4099992"/>
           </a:xfrm>
         </p:grpSpPr>
-        <p:grpSp>
-          <p:nvGrpSpPr>
-            <p:cNvPr id="158" name="Group 157">
-              <a:extLst>
-                <a:ext uri="{FF2B5EF4-FFF2-40B4-BE49-F238E27FC236}">
-                  <a16:creationId xmlns:a16="http://schemas.microsoft.com/office/drawing/2014/main" id="{808CCF02-E6C6-E681-D019-5CCB1524E8FB}"/>
-                </a:ext>
-              </a:extLst>
-            </p:cNvPr>
-            <p:cNvGrpSpPr/>
+        <p:sp>
+          <p:nvSpPr>
+            <p:cNvPr id="114" name="Google Shape;114;p1"/>
+            <p:cNvSpPr txBox="1"/>
             <p:nvPr/>
-          </p:nvGrpSpPr>
-          <p:grpSpPr>
+          </p:nvSpPr>
+          <p:spPr>
             <a:xfrm>
-              <a:off x="31768534" y="24697708"/>
-              <a:ext cx="11894062" cy="3981257"/>
-              <a:chOff x="31953484" y="26517599"/>
-              <a:chExt cx="11894062" cy="3981257"/>
+              <a:off x="31953484" y="27660599"/>
+              <a:ext cx="11887200" cy="2956992"/>
             </a:xfrm>
-          </p:grpSpPr>
-          <p:sp>
-            <p:nvSpPr>
-              <p:cNvPr id="96" name="Google Shape;96;p1"/>
-              <p:cNvSpPr txBox="1"/>
-              <p:nvPr/>
-            </p:nvSpPr>
-            <p:spPr>
-              <a:xfrm>
-                <a:off x="32874750" y="26517599"/>
-                <a:ext cx="10058400" cy="1143000"/>
-              </a:xfrm>
-              <a:prstGeom prst="rect">
-                <a:avLst/>
-              </a:prstGeom>
-              <a:solidFill>
-                <a:srgbClr val="FFFFFF"/>
-              </a:solidFill>
-              <a:ln w="9525" cap="flat" cmpd="sng">
-                <a:solidFill>
-                  <a:srgbClr val="FFFFFF"/>
-                </a:solidFill>
-                <a:prstDash val="solid"/>
-                <a:round/>
-                <a:headEnd type="none" w="sm" len="sm"/>
-                <a:tailEnd type="none" w="sm" len="sm"/>
-              </a:ln>
-            </p:spPr>
-            <p:txBody>
-              <a:bodyPr spcFirstLastPara="1" wrap="square" lIns="104475" tIns="52250" rIns="104475" bIns="52250" anchor="t" anchorCtr="0">
-                <a:noAutofit/>
-              </a:bodyPr>
-              <a:lstStyle/>
-              <a:p>
-                <a:pPr marL="0" marR="0" lvl="0" indent="0" algn="ctr" rtl="0">
-                  <a:lnSpc>
-                    <a:spcPct val="100000"/>
-                  </a:lnSpc>
-                  <a:spcBef>
-                    <a:spcPts val="0"/>
-                  </a:spcBef>
-                  <a:spcAft>
-                    <a:spcPts val="0"/>
-                  </a:spcAft>
-                  <a:buClr>
-                    <a:srgbClr val="000000"/>
-                  </a:buClr>
-                  <a:buSzPts val="6800"/>
-                  <a:buFont typeface="Arial"/>
-                  <a:buNone/>
-                </a:pPr>
-                <a:r>
-                  <a:rPr lang="en-US" sz="6800" b="1" i="0" u="none" strike="noStrike" cap="none" dirty="0">
-                    <a:solidFill>
-                      <a:srgbClr val="77933C"/>
-                    </a:solidFill>
-                    <a:latin typeface="Arial"/>
-                    <a:ea typeface="Arial"/>
-                    <a:cs typeface="Arial"/>
-                    <a:sym typeface="Arial"/>
-                  </a:rPr>
-                  <a:t>Acknowledgments</a:t>
-                </a:r>
-                <a:endParaRPr sz="2267" b="0" i="0" u="none" strike="noStrike" cap="none" dirty="0">
+            <a:prstGeom prst="rect">
+              <a:avLst/>
+            </a:prstGeom>
+            <a:noFill/>
+            <a:ln>
+              <a:noFill/>
+            </a:ln>
+          </p:spPr>
+          <p:txBody>
+            <a:bodyPr spcFirstLastPara="1" wrap="square" lIns="91425" tIns="45700" rIns="91425" bIns="45700" anchor="t" anchorCtr="0">
+              <a:normAutofit fontScale="92500" lnSpcReduction="20000"/>
+            </a:bodyPr>
+            <a:lstStyle/>
+            <a:p>
+              <a:pPr marL="342900" marR="0" lvl="0" indent="-342900" algn="l" rtl="0">
+                <a:lnSpc>
+                  <a:spcPct val="100000"/>
+                </a:lnSpc>
+                <a:spcBef>
+                  <a:spcPts val="0"/>
+                </a:spcBef>
+                <a:spcAft>
+                  <a:spcPts val="600"/>
+                </a:spcAft>
+                <a:buClr>
+                  <a:srgbClr val="000000"/>
+                </a:buClr>
+                <a:buSzPts val="1800"/>
+                <a:buFont typeface="Arial" panose="020B0604020202020204" pitchFamily="34" charset="0"/>
+                <a:buChar char="•"/>
+              </a:pPr>
+              <a:r>
+                <a:rPr lang="en-US" sz="2400" b="0" i="0" u="none" strike="noStrike" cap="none" dirty="0">
                   <a:solidFill>
                     <a:schemeClr val="dk1"/>
                   </a:solidFill>
@@ -21507,59 +21635,11 @@
                   <a:ea typeface="Arial"/>
                   <a:cs typeface="Arial"/>
                   <a:sym typeface="Arial"/>
-                </a:endParaRPr>
-              </a:p>
-            </p:txBody>
-          </p:sp>
-          <p:sp>
-            <p:nvSpPr>
-              <p:cNvPr id="105" name="Google Shape;105;p1"/>
-              <p:cNvSpPr/>
-              <p:nvPr/>
-            </p:nvSpPr>
-            <p:spPr>
-              <a:xfrm>
-                <a:off x="32883600" y="27660600"/>
-                <a:ext cx="10040700" cy="1828800"/>
-              </a:xfrm>
-              <a:prstGeom prst="rect">
-                <a:avLst/>
-              </a:prstGeom>
-              <a:noFill/>
-              <a:ln w="9525" cap="flat" cmpd="sng">
-                <a:solidFill>
-                  <a:srgbClr val="D8D8D8"/>
-                </a:solidFill>
-                <a:prstDash val="solid"/>
-                <a:round/>
-                <a:headEnd type="none" w="sm" len="sm"/>
-                <a:tailEnd type="none" w="sm" len="sm"/>
-              </a:ln>
-            </p:spPr>
-            <p:txBody>
-              <a:bodyPr spcFirstLastPara="1" wrap="square" lIns="91425" tIns="45700" rIns="91425" bIns="45700" anchor="ctr" anchorCtr="0">
-                <a:noAutofit/>
-              </a:bodyPr>
-              <a:lstStyle/>
-              <a:p>
-                <a:pPr marL="0" marR="0" lvl="0" indent="0" algn="ctr" rtl="0">
-                  <a:lnSpc>
-                    <a:spcPct val="100000"/>
-                  </a:lnSpc>
-                  <a:spcBef>
-                    <a:spcPts val="0"/>
-                  </a:spcBef>
-                  <a:spcAft>
-                    <a:spcPts val="0"/>
-                  </a:spcAft>
-                  <a:buClr>
-                    <a:srgbClr val="000000"/>
-                  </a:buClr>
-                  <a:buSzPts val="13950"/>
-                  <a:buFont typeface="Arial"/>
-                  <a:buNone/>
-                </a:pPr>
-                <a:endParaRPr sz="13950" b="0" i="0" u="none" strike="noStrike" cap="none">
+                </a:rPr>
+                <a:t>Thank you to Erin Jesuit of the </a:t>
+              </a:r>
+              <a:r>
+                <a:rPr lang="en-US" sz="2400" b="0" i="0" u="none" strike="noStrike" cap="none" dirty="0" err="1">
                   <a:solidFill>
                     <a:schemeClr val="dk1"/>
                   </a:solidFill>
@@ -21567,161 +21647,11 @@
                   <a:ea typeface="Arial"/>
                   <a:cs typeface="Arial"/>
                   <a:sym typeface="Arial"/>
-                </a:endParaRPr>
-              </a:p>
-            </p:txBody>
-          </p:sp>
-          <p:sp>
-            <p:nvSpPr>
-              <p:cNvPr id="114" name="Google Shape;114;p1"/>
-              <p:cNvSpPr txBox="1"/>
-              <p:nvPr/>
-            </p:nvSpPr>
-            <p:spPr>
-              <a:xfrm>
-                <a:off x="31953484" y="27660599"/>
-                <a:ext cx="11894062" cy="2838257"/>
-              </a:xfrm>
-              <a:prstGeom prst="rect">
-                <a:avLst/>
-              </a:prstGeom>
-              <a:noFill/>
-              <a:ln>
-                <a:noFill/>
-              </a:ln>
-            </p:spPr>
-            <p:txBody>
-              <a:bodyPr spcFirstLastPara="1" wrap="square" lIns="91425" tIns="45700" rIns="91425" bIns="45700" anchor="t" anchorCtr="0">
-                <a:noAutofit/>
-              </a:bodyPr>
-              <a:lstStyle/>
-              <a:p>
-                <a:pPr marL="0" marR="0" lvl="0" indent="0" algn="l" rtl="0">
-                  <a:lnSpc>
-                    <a:spcPct val="100000"/>
-                  </a:lnSpc>
-                  <a:spcBef>
-                    <a:spcPts val="0"/>
-                  </a:spcBef>
-                  <a:spcAft>
-                    <a:spcPts val="0"/>
-                  </a:spcAft>
-                  <a:buClr>
-                    <a:srgbClr val="000000"/>
-                  </a:buClr>
-                  <a:buSzPts val="1800"/>
-                  <a:buFont typeface="Arial"/>
-                  <a:buNone/>
-                </a:pPr>
-                <a:r>
-                  <a:rPr lang="en-US" sz="2400" b="0" i="0" u="none" strike="noStrike" cap="none" dirty="0">
-                    <a:solidFill>
-                      <a:schemeClr val="dk1"/>
-                    </a:solidFill>
-                    <a:latin typeface="Arial"/>
-                    <a:ea typeface="Arial"/>
-                    <a:cs typeface="Arial"/>
-                    <a:sym typeface="Arial"/>
-                  </a:rPr>
-                  <a:t>Thank you to Erin Jesuit of the </a:t>
-                </a:r>
-                <a:r>
-                  <a:rPr lang="en-US" sz="2400" b="0" i="0" u="none" strike="noStrike" cap="none" dirty="0" err="1">
-                    <a:solidFill>
-                      <a:schemeClr val="dk1"/>
-                    </a:solidFill>
-                    <a:latin typeface="Arial"/>
-                    <a:ea typeface="Arial"/>
-                    <a:cs typeface="Arial"/>
-                    <a:sym typeface="Arial"/>
-                  </a:rPr>
-                  <a:t>VonDassow</a:t>
-                </a:r>
-                <a:r>
-                  <a:rPr lang="en-US" sz="2400" b="0" i="0" u="none" strike="noStrike" cap="none" dirty="0">
-                    <a:solidFill>
-                      <a:schemeClr val="dk1"/>
-                    </a:solidFill>
-                    <a:latin typeface="Arial"/>
-                    <a:ea typeface="Arial"/>
-                    <a:cs typeface="Arial"/>
-                    <a:sym typeface="Arial"/>
-                  </a:rPr>
-                  <a:t> Lab at OIMB for your help collecting and analyzing </a:t>
-                </a:r>
-                <a:r>
-                  <a:rPr lang="en-US" sz="2400" b="0" i="1" u="none" strike="noStrike" cap="none" dirty="0">
-                    <a:solidFill>
-                      <a:schemeClr val="dk1"/>
-                    </a:solidFill>
-                    <a:latin typeface="Arial"/>
-                    <a:ea typeface="Arial"/>
-                    <a:cs typeface="Arial"/>
-                    <a:sym typeface="Arial"/>
-                  </a:rPr>
-                  <a:t>B. glandula</a:t>
-                </a:r>
-                <a:r>
-                  <a:rPr lang="en-US" sz="2400" b="0" u="none" strike="noStrike" cap="none" dirty="0">
-                    <a:solidFill>
-                      <a:schemeClr val="dk1"/>
-                    </a:solidFill>
-                    <a:latin typeface="Arial"/>
-                    <a:ea typeface="Arial"/>
-                    <a:cs typeface="Arial"/>
-                    <a:sym typeface="Arial"/>
-                  </a:rPr>
-                  <a:t> samples. To Dave Sutherland for providing environmental models of Coos Bay, OR, produced by the Sutherland Lab. To </a:t>
-                </a:r>
-                <a:r>
-                  <a:rPr lang="en-US" sz="2400" b="0" i="0" u="none" strike="noStrike" cap="none" dirty="0">
-                    <a:solidFill>
-                      <a:schemeClr val="dk1"/>
-                    </a:solidFill>
-                    <a:latin typeface="Arial"/>
-                    <a:ea typeface="Arial"/>
-                    <a:cs typeface="Arial"/>
-                    <a:sym typeface="Arial"/>
-                  </a:rPr>
-                  <a:t>the entirety of the Kern Ralph Co-Lab for being a wonderful group to collaborate and research with. To Ben Haller and Philipp Messer for the development </a:t>
-                </a:r>
-                <a:r>
-                  <a:rPr lang="en-US" sz="2400" dirty="0">
-                    <a:solidFill>
-                      <a:schemeClr val="dk1"/>
-                    </a:solidFill>
-                  </a:rPr>
-                  <a:t>of </a:t>
-                </a:r>
-                <a:r>
-                  <a:rPr lang="en-US" sz="2400" dirty="0" err="1">
-                    <a:solidFill>
-                      <a:schemeClr val="dk1"/>
-                    </a:solidFill>
-                  </a:rPr>
-                  <a:t>SLiM</a:t>
-                </a:r>
-                <a:r>
-                  <a:rPr lang="en-US" sz="2400" dirty="0">
-                    <a:solidFill>
-                      <a:schemeClr val="dk1"/>
-                    </a:solidFill>
-                  </a:rPr>
-                  <a:t>: An Evolutionary Simulation Framework. </a:t>
-                </a:r>
-                <a:r>
-                  <a:rPr lang="en-US" sz="2400" b="0" i="0" u="none" strike="noStrike" cap="none" dirty="0">
-                    <a:solidFill>
-                      <a:schemeClr val="dk1"/>
-                    </a:solidFill>
-                    <a:latin typeface="Arial"/>
-                    <a:ea typeface="Arial"/>
-                    <a:cs typeface="Arial"/>
-                    <a:sym typeface="Arial"/>
-                  </a:rPr>
-                  <a:t>And to the University of Oregon Summer Program for Undergraduate Research and the Mary G. Alden Fellowship for the opportunity to pursue summer research.</a:t>
-                </a:r>
-                <a:endParaRPr sz="2400" b="0" i="0" u="none" strike="noStrike" cap="none" dirty="0">
+                </a:rPr>
+                <a:t>VonDassow</a:t>
+              </a:r>
+              <a:r>
+                <a:rPr lang="en-US" sz="2400" b="0" i="0" u="none" strike="noStrike" cap="none" dirty="0">
                   <a:solidFill>
                     <a:schemeClr val="dk1"/>
                   </a:solidFill>
@@ -21729,125 +21659,266 @@
                   <a:ea typeface="Arial"/>
                   <a:cs typeface="Arial"/>
                   <a:sym typeface="Arial"/>
-                </a:endParaRPr>
-              </a:p>
-            </p:txBody>
-          </p:sp>
-        </p:grpSp>
-        <p:cxnSp>
-          <p:nvCxnSpPr>
-            <p:cNvPr id="148" name="Google Shape;97;p1">
-              <a:extLst>
-                <a:ext uri="{FF2B5EF4-FFF2-40B4-BE49-F238E27FC236}">
-                  <a16:creationId xmlns:a16="http://schemas.microsoft.com/office/drawing/2014/main" id="{88B21156-FAE5-A48F-2424-C5492DBA0907}"/>
-                </a:ext>
-              </a:extLst>
-            </p:cNvPr>
-            <p:cNvCxnSpPr/>
-            <p:nvPr/>
-          </p:nvCxnSpPr>
-          <p:spPr>
-            <a:xfrm>
-              <a:off x="31546800" y="24460200"/>
-              <a:ext cx="12344400" cy="0"/>
-            </a:xfrm>
-            <a:prstGeom prst="straightConnector1">
-              <a:avLst/>
-            </a:prstGeom>
-            <a:noFill/>
-            <a:ln w="25400" cap="flat" cmpd="sng">
-              <a:solidFill>
-                <a:schemeClr val="dk1"/>
-              </a:solidFill>
-              <a:prstDash val="solid"/>
-              <a:round/>
-              <a:headEnd type="none" w="sm" len="sm"/>
-              <a:tailEnd type="none" w="sm" len="sm"/>
-            </a:ln>
-            <a:effectLst>
-              <a:outerShdw blurRad="40000" dist="20000" dir="5400000" rotWithShape="0">
-                <a:srgbClr val="000000">
-                  <a:alpha val="36470"/>
-                </a:srgbClr>
-              </a:outerShdw>
-            </a:effectLst>
-          </p:spPr>
-        </p:cxnSp>
-      </p:grpSp>
-      <p:cxnSp>
-        <p:nvCxnSpPr>
-          <p:cNvPr id="150" name="Google Shape;97;p1">
-            <a:extLst>
-              <a:ext uri="{FF2B5EF4-FFF2-40B4-BE49-F238E27FC236}">
-                <a16:creationId xmlns:a16="http://schemas.microsoft.com/office/drawing/2014/main" id="{634446FE-9F35-55A5-80FF-45EDDF19EED1}"/>
-              </a:ext>
-            </a:extLst>
-          </p:cNvPr>
-          <p:cNvCxnSpPr/>
-          <p:nvPr/>
-        </p:nvCxnSpPr>
-        <p:spPr>
-          <a:xfrm>
-            <a:off x="31546800" y="28803600"/>
-            <a:ext cx="12344400" cy="0"/>
-          </a:xfrm>
-          <a:prstGeom prst="straightConnector1">
-            <a:avLst/>
-          </a:prstGeom>
-          <a:noFill/>
-          <a:ln w="25400" cap="flat" cmpd="sng">
-            <a:solidFill>
-              <a:schemeClr val="dk1"/>
-            </a:solidFill>
-            <a:prstDash val="solid"/>
-            <a:round/>
-            <a:headEnd type="none" w="sm" len="sm"/>
-            <a:tailEnd type="none" w="sm" len="sm"/>
-          </a:ln>
-          <a:effectLst>
-            <a:outerShdw blurRad="40000" dist="20000" dir="5400000" rotWithShape="0">
-              <a:srgbClr val="000000">
-                <a:alpha val="36470"/>
-              </a:srgbClr>
-            </a:outerShdw>
-          </a:effectLst>
-        </p:spPr>
-      </p:cxnSp>
-      <p:grpSp>
-        <p:nvGrpSpPr>
-          <p:cNvPr id="157" name="Group 156">
-            <a:extLst>
-              <a:ext uri="{FF2B5EF4-FFF2-40B4-BE49-F238E27FC236}">
-                <a16:creationId xmlns:a16="http://schemas.microsoft.com/office/drawing/2014/main" id="{4596EA19-3F70-21AF-1C99-78574F6137A5}"/>
-              </a:ext>
-            </a:extLst>
-          </p:cNvPr>
-          <p:cNvGrpSpPr/>
-          <p:nvPr/>
-        </p:nvGrpSpPr>
-        <p:grpSpPr>
-          <a:xfrm>
-            <a:off x="32689800" y="28928228"/>
-            <a:ext cx="10058400" cy="3816446"/>
-            <a:chOff x="33229800" y="26669999"/>
-            <a:chExt cx="10131900" cy="4134485"/>
-          </a:xfrm>
-        </p:grpSpPr>
+                </a:rPr>
+                <a:t> Lab at OIMB for your help collecting and analyzing </a:t>
+              </a:r>
+              <a:r>
+                <a:rPr lang="en-US" sz="2400" b="0" i="1" u="none" strike="noStrike" cap="none" dirty="0">
+                  <a:solidFill>
+                    <a:schemeClr val="dk1"/>
+                  </a:solidFill>
+                  <a:latin typeface="Arial"/>
+                  <a:ea typeface="Arial"/>
+                  <a:cs typeface="Arial"/>
+                  <a:sym typeface="Arial"/>
+                </a:rPr>
+                <a:t>B. glandula</a:t>
+              </a:r>
+              <a:r>
+                <a:rPr lang="en-US" sz="2400" b="0" u="none" strike="noStrike" cap="none" dirty="0">
+                  <a:solidFill>
+                    <a:schemeClr val="dk1"/>
+                  </a:solidFill>
+                  <a:latin typeface="Arial"/>
+                  <a:ea typeface="Arial"/>
+                  <a:cs typeface="Arial"/>
+                  <a:sym typeface="Arial"/>
+                </a:rPr>
+                <a:t> samples. </a:t>
+              </a:r>
+            </a:p>
+            <a:p>
+              <a:pPr marL="342900" marR="0" lvl="0" indent="-342900" algn="l" rtl="0">
+                <a:lnSpc>
+                  <a:spcPct val="100000"/>
+                </a:lnSpc>
+                <a:spcBef>
+                  <a:spcPts val="0"/>
+                </a:spcBef>
+                <a:spcAft>
+                  <a:spcPts val="600"/>
+                </a:spcAft>
+                <a:buClr>
+                  <a:srgbClr val="000000"/>
+                </a:buClr>
+                <a:buSzPts val="1800"/>
+                <a:buFont typeface="Arial" panose="020B0604020202020204" pitchFamily="34" charset="0"/>
+                <a:buChar char="•"/>
+              </a:pPr>
+              <a:r>
+                <a:rPr lang="en-US" sz="2400" b="0" u="none" strike="noStrike" cap="none" dirty="0">
+                  <a:solidFill>
+                    <a:schemeClr val="dk1"/>
+                  </a:solidFill>
+                  <a:latin typeface="Arial"/>
+                  <a:ea typeface="Arial"/>
+                  <a:cs typeface="Arial"/>
+                  <a:sym typeface="Arial"/>
+                </a:rPr>
+                <a:t>To Dave Sutherland for providing environmental models of Coos Bay, OR</a:t>
+              </a:r>
+              <a:r>
+                <a:rPr lang="en-US" sz="2400" dirty="0">
+                  <a:solidFill>
+                    <a:schemeClr val="dk1"/>
+                  </a:solidFill>
+                </a:rPr>
+                <a:t>.</a:t>
+              </a:r>
+              <a:endParaRPr lang="en-US" sz="2400" b="0" u="none" strike="noStrike" cap="none" dirty="0">
+                <a:solidFill>
+                  <a:schemeClr val="dk1"/>
+                </a:solidFill>
+                <a:latin typeface="Arial"/>
+                <a:ea typeface="Arial"/>
+                <a:cs typeface="Arial"/>
+                <a:sym typeface="Arial"/>
+              </a:endParaRPr>
+            </a:p>
+            <a:p>
+              <a:pPr marL="342900" marR="0" lvl="0" indent="-342900" algn="l" rtl="0">
+                <a:lnSpc>
+                  <a:spcPct val="100000"/>
+                </a:lnSpc>
+                <a:spcBef>
+                  <a:spcPts val="0"/>
+                </a:spcBef>
+                <a:spcAft>
+                  <a:spcPts val="600"/>
+                </a:spcAft>
+                <a:buClr>
+                  <a:srgbClr val="000000"/>
+                </a:buClr>
+                <a:buSzPts val="1800"/>
+                <a:buFont typeface="Arial" panose="020B0604020202020204" pitchFamily="34" charset="0"/>
+                <a:buChar char="•"/>
+              </a:pPr>
+              <a:r>
+                <a:rPr lang="en-US" sz="2400" b="0" u="none" strike="noStrike" cap="none" dirty="0">
+                  <a:solidFill>
+                    <a:schemeClr val="dk1"/>
+                  </a:solidFill>
+                  <a:latin typeface="Arial"/>
+                  <a:ea typeface="Arial"/>
+                  <a:cs typeface="Arial"/>
+                  <a:sym typeface="Arial"/>
+                </a:rPr>
+                <a:t>To </a:t>
+              </a:r>
+              <a:r>
+                <a:rPr lang="en-US" sz="2400" b="0" i="0" u="none" strike="noStrike" cap="none" dirty="0">
+                  <a:solidFill>
+                    <a:schemeClr val="dk1"/>
+                  </a:solidFill>
+                  <a:latin typeface="Arial"/>
+                  <a:ea typeface="Arial"/>
+                  <a:cs typeface="Arial"/>
+                  <a:sym typeface="Arial"/>
+                </a:rPr>
+                <a:t>the Kern Ralph Co-Lab for being a wonderful group to collaborate and learn with.</a:t>
+              </a:r>
+            </a:p>
+            <a:p>
+              <a:pPr marL="342900" marR="0" lvl="0" indent="-342900" algn="l" rtl="0">
+                <a:lnSpc>
+                  <a:spcPct val="100000"/>
+                </a:lnSpc>
+                <a:spcBef>
+                  <a:spcPts val="0"/>
+                </a:spcBef>
+                <a:spcAft>
+                  <a:spcPts val="600"/>
+                </a:spcAft>
+                <a:buClr>
+                  <a:srgbClr val="000000"/>
+                </a:buClr>
+                <a:buSzPts val="1800"/>
+                <a:buFont typeface="Arial" panose="020B0604020202020204" pitchFamily="34" charset="0"/>
+                <a:buChar char="•"/>
+              </a:pPr>
+              <a:r>
+                <a:rPr lang="en-US" sz="2400" b="0" i="0" u="none" strike="noStrike" cap="none" dirty="0">
+                  <a:solidFill>
+                    <a:schemeClr val="dk1"/>
+                  </a:solidFill>
+                  <a:latin typeface="Arial"/>
+                  <a:ea typeface="Arial"/>
+                  <a:cs typeface="Arial"/>
+                  <a:sym typeface="Arial"/>
+                </a:rPr>
+                <a:t>To Ben Haller and Philipp Messer for the development </a:t>
+              </a:r>
+              <a:r>
+                <a:rPr lang="en-US" sz="2400" dirty="0">
+                  <a:solidFill>
+                    <a:schemeClr val="dk1"/>
+                  </a:solidFill>
+                </a:rPr>
+                <a:t>of </a:t>
+              </a:r>
+              <a:r>
+                <a:rPr lang="en-US" sz="2400" dirty="0" err="1">
+                  <a:solidFill>
+                    <a:schemeClr val="dk1"/>
+                  </a:solidFill>
+                </a:rPr>
+                <a:t>SLiM</a:t>
+              </a:r>
+              <a:r>
+                <a:rPr lang="en-US" sz="2400" dirty="0">
+                  <a:solidFill>
+                    <a:schemeClr val="dk1"/>
+                  </a:solidFill>
+                </a:rPr>
+                <a:t>: An Evolutionary Simulation Framework. </a:t>
+              </a:r>
+            </a:p>
+            <a:p>
+              <a:pPr marL="342900" marR="0" lvl="0" indent="-342900" algn="l" rtl="0">
+                <a:lnSpc>
+                  <a:spcPct val="100000"/>
+                </a:lnSpc>
+                <a:spcBef>
+                  <a:spcPts val="0"/>
+                </a:spcBef>
+                <a:spcAft>
+                  <a:spcPts val="600"/>
+                </a:spcAft>
+                <a:buClr>
+                  <a:srgbClr val="000000"/>
+                </a:buClr>
+                <a:buSzPts val="1800"/>
+                <a:buFont typeface="Arial" panose="020B0604020202020204" pitchFamily="34" charset="0"/>
+                <a:buChar char="•"/>
+              </a:pPr>
+              <a:r>
+                <a:rPr lang="en-US" sz="2400" dirty="0">
+                  <a:solidFill>
+                    <a:schemeClr val="dk1"/>
+                  </a:solidFill>
+                </a:rPr>
+                <a:t>T</a:t>
+              </a:r>
+              <a:r>
+                <a:rPr lang="en-US" sz="2400" b="0" i="0" u="none" strike="noStrike" cap="none" dirty="0">
+                  <a:solidFill>
+                    <a:schemeClr val="dk1"/>
+                  </a:solidFill>
+                  <a:latin typeface="Arial"/>
+                  <a:ea typeface="Arial"/>
+                  <a:cs typeface="Arial"/>
+                  <a:sym typeface="Arial"/>
+                </a:rPr>
+                <a:t>o the University of Oregon Summer Program for Undergraduate Research and the Mary G. Alden Fellowship for the funding to pursue summer research.</a:t>
+              </a:r>
+            </a:p>
+            <a:p>
+              <a:pPr marL="342900" marR="0" lvl="0" indent="-342900" algn="l" rtl="0">
+                <a:lnSpc>
+                  <a:spcPct val="100000"/>
+                </a:lnSpc>
+                <a:spcBef>
+                  <a:spcPts val="0"/>
+                </a:spcBef>
+                <a:spcAft>
+                  <a:spcPts val="600"/>
+                </a:spcAft>
+                <a:buClr>
+                  <a:srgbClr val="000000"/>
+                </a:buClr>
+                <a:buSzPts val="1800"/>
+                <a:buFont typeface="Arial" panose="020B0604020202020204" pitchFamily="34" charset="0"/>
+                <a:buChar char="•"/>
+              </a:pPr>
+              <a:r>
+                <a:rPr lang="en-US" sz="2400" dirty="0">
+                  <a:solidFill>
+                    <a:schemeClr val="dk1"/>
+                  </a:solidFill>
+                </a:rPr>
+                <a:t>And to ASM for providing a travel award to attend ABRCMS 2024</a:t>
+              </a:r>
+              <a:endParaRPr sz="2400" b="0" i="0" u="none" strike="noStrike" cap="none" dirty="0">
+                <a:solidFill>
+                  <a:schemeClr val="dk1"/>
+                </a:solidFill>
+                <a:latin typeface="Arial"/>
+                <a:ea typeface="Arial"/>
+                <a:cs typeface="Arial"/>
+                <a:sym typeface="Arial"/>
+              </a:endParaRPr>
+            </a:p>
+          </p:txBody>
+        </p:sp>
         <p:sp>
           <p:nvSpPr>
-            <p:cNvPr id="153" name="Google Shape;96;p1">
-              <a:extLst>
-                <a:ext uri="{FF2B5EF4-FFF2-40B4-BE49-F238E27FC236}">
-                  <a16:creationId xmlns:a16="http://schemas.microsoft.com/office/drawing/2014/main" id="{31FBF473-4E2F-0DFE-912B-26CFEC75EDC7}"/>
-                </a:ext>
-              </a:extLst>
-            </p:cNvPr>
+            <p:cNvPr id="96" name="Google Shape;96;p1"/>
             <p:cNvSpPr txBox="1"/>
             <p:nvPr/>
           </p:nvSpPr>
           <p:spPr>
             <a:xfrm>
-              <a:off x="33303300" y="26669999"/>
+              <a:off x="32874750" y="26517599"/>
               <a:ext cx="10058400" cy="1143000"/>
             </a:xfrm>
             <a:prstGeom prst="rect">
@@ -21890,7 +21961,7 @@
                 <a:buNone/>
               </a:pPr>
               <a:r>
-                <a:rPr lang="en-US" sz="4500" b="1" i="0" u="none" strike="noStrike" cap="none" dirty="0">
+                <a:rPr lang="en-US" sz="6800" b="1" i="0" u="none" strike="noStrike" cap="none" dirty="0">
                   <a:solidFill>
                     <a:srgbClr val="77933C"/>
                   </a:solidFill>
@@ -21899,147 +21970,9 @@
                   <a:cs typeface="Arial"/>
                   <a:sym typeface="Arial"/>
                 </a:rPr>
-                <a:t>References</a:t>
+                <a:t>Acknowledgments</a:t>
               </a:r>
-              <a:endParaRPr sz="4500" b="0" i="0" u="none" strike="noStrike" cap="none" dirty="0">
-                <a:solidFill>
-                  <a:schemeClr val="dk1"/>
-                </a:solidFill>
-                <a:latin typeface="Arial"/>
-                <a:ea typeface="Arial"/>
-                <a:cs typeface="Arial"/>
-                <a:sym typeface="Arial"/>
-              </a:endParaRPr>
-            </a:p>
-          </p:txBody>
-        </p:sp>
-        <p:sp>
-          <p:nvSpPr>
-            <p:cNvPr id="155" name="Google Shape;105;p1">
-              <a:extLst>
-                <a:ext uri="{FF2B5EF4-FFF2-40B4-BE49-F238E27FC236}">
-                  <a16:creationId xmlns:a16="http://schemas.microsoft.com/office/drawing/2014/main" id="{C4EBDE09-DC0D-8803-AC90-900CE332CB71}"/>
-                </a:ext>
-              </a:extLst>
-            </p:cNvPr>
-            <p:cNvSpPr/>
-            <p:nvPr/>
-          </p:nvSpPr>
-          <p:spPr>
-            <a:xfrm>
-              <a:off x="33229800" y="27415957"/>
-              <a:ext cx="10040700" cy="2225843"/>
-            </a:xfrm>
-            <a:prstGeom prst="rect">
-              <a:avLst/>
-            </a:prstGeom>
-            <a:noFill/>
-            <a:ln w="9525" cap="flat" cmpd="sng">
-              <a:solidFill>
-                <a:srgbClr val="D8D8D8"/>
-              </a:solidFill>
-              <a:prstDash val="solid"/>
-              <a:round/>
-              <a:headEnd type="none" w="sm" len="sm"/>
-              <a:tailEnd type="none" w="sm" len="sm"/>
-            </a:ln>
-          </p:spPr>
-          <p:txBody>
-            <a:bodyPr spcFirstLastPara="1" wrap="square" lIns="91425" tIns="45700" rIns="91425" bIns="45700" anchor="ctr" anchorCtr="0">
-              <a:noAutofit/>
-            </a:bodyPr>
-            <a:lstStyle/>
-            <a:p>
-              <a:pPr marL="0" marR="0" lvl="0" indent="0" algn="ctr" rtl="0">
-                <a:lnSpc>
-                  <a:spcPct val="100000"/>
-                </a:lnSpc>
-                <a:spcBef>
-                  <a:spcPts val="0"/>
-                </a:spcBef>
-                <a:spcAft>
-                  <a:spcPts val="0"/>
-                </a:spcAft>
-                <a:buClr>
-                  <a:srgbClr val="000000"/>
-                </a:buClr>
-                <a:buSzPts val="13950"/>
-                <a:buFont typeface="Arial"/>
-                <a:buNone/>
-              </a:pPr>
-              <a:endParaRPr sz="13950" b="0" i="0" u="none" strike="noStrike" cap="none">
-                <a:solidFill>
-                  <a:schemeClr val="dk1"/>
-                </a:solidFill>
-                <a:latin typeface="Arial"/>
-                <a:ea typeface="Arial"/>
-                <a:cs typeface="Arial"/>
-                <a:sym typeface="Arial"/>
-              </a:endParaRPr>
-            </a:p>
-          </p:txBody>
-        </p:sp>
-        <p:sp>
-          <p:nvSpPr>
-            <p:cNvPr id="156" name="Google Shape;114;p1">
-              <a:extLst>
-                <a:ext uri="{FF2B5EF4-FFF2-40B4-BE49-F238E27FC236}">
-                  <a16:creationId xmlns:a16="http://schemas.microsoft.com/office/drawing/2014/main" id="{E23C6F3B-144A-BE51-A5DF-21E43D2B5DC4}"/>
-                </a:ext>
-              </a:extLst>
-            </p:cNvPr>
-            <p:cNvSpPr txBox="1"/>
-            <p:nvPr/>
-          </p:nvSpPr>
-          <p:spPr>
-            <a:xfrm>
-              <a:off x="33303300" y="27415956"/>
-              <a:ext cx="9897600" cy="3388528"/>
-            </a:xfrm>
-            <a:prstGeom prst="rect">
-              <a:avLst/>
-            </a:prstGeom>
-            <a:noFill/>
-            <a:ln>
-              <a:noFill/>
-            </a:ln>
-          </p:spPr>
-          <p:txBody>
-            <a:bodyPr spcFirstLastPara="1" wrap="square" lIns="91425" tIns="45700" rIns="91425" bIns="45700" anchor="t" anchorCtr="0">
-              <a:noAutofit/>
-            </a:bodyPr>
-            <a:lstStyle/>
-            <a:p>
-              <a:pPr marL="0" marR="0" lvl="0" indent="0" algn="l" rtl="0">
-                <a:lnSpc>
-                  <a:spcPct val="100000"/>
-                </a:lnSpc>
-                <a:spcBef>
-                  <a:spcPts val="0"/>
-                </a:spcBef>
-                <a:spcAft>
-                  <a:spcPts val="0"/>
-                </a:spcAft>
-                <a:buClr>
-                  <a:srgbClr val="000000"/>
-                </a:buClr>
-                <a:buSzPts val="1800"/>
-                <a:buFont typeface="Arial"/>
-                <a:buNone/>
-              </a:pPr>
-              <a:r>
-                <a:rPr lang="en-US" sz="1800" b="0" i="0" u="none" strike="noStrike" cap="none" dirty="0">
-                  <a:solidFill>
-                    <a:schemeClr val="dk1"/>
-                  </a:solidFill>
-                  <a:latin typeface="Arial"/>
-                  <a:ea typeface="Arial"/>
-                  <a:cs typeface="Arial"/>
-                  <a:sym typeface="Arial"/>
-                </a:rPr>
-                <a:t>To Be Added</a:t>
-              </a:r>
-              <a:endParaRPr sz="1800" b="0" i="0" u="none" strike="noStrike" cap="none" dirty="0">
+              <a:endParaRPr sz="2267" b="0" i="0" u="none" strike="noStrike" cap="none" dirty="0">
                 <a:solidFill>
                   <a:schemeClr val="dk1"/>
                 </a:solidFill>
@@ -22052,6 +21985,164 @@
           </p:txBody>
         </p:sp>
       </p:grpSp>
+      <p:cxnSp>
+        <p:nvCxnSpPr>
+          <p:cNvPr id="148" name="Google Shape;97;p1">
+            <a:extLst>
+              <a:ext uri="{FF2B5EF4-FFF2-40B4-BE49-F238E27FC236}">
+                <a16:creationId xmlns:a16="http://schemas.microsoft.com/office/drawing/2014/main" id="{88B21156-FAE5-A48F-2424-C5492DBA0907}"/>
+              </a:ext>
+            </a:extLst>
+          </p:cNvPr>
+          <p:cNvCxnSpPr/>
+          <p:nvPr/>
+        </p:nvCxnSpPr>
+        <p:spPr>
+          <a:xfrm>
+            <a:off x="31546800" y="24250656"/>
+            <a:ext cx="12344400" cy="0"/>
+          </a:xfrm>
+          <a:prstGeom prst="straightConnector1">
+            <a:avLst/>
+          </a:prstGeom>
+          <a:noFill/>
+          <a:ln w="25400" cap="flat" cmpd="sng">
+            <a:solidFill>
+              <a:schemeClr val="dk1"/>
+            </a:solidFill>
+            <a:prstDash val="solid"/>
+            <a:round/>
+            <a:headEnd type="none" w="sm" len="sm"/>
+            <a:tailEnd type="none" w="sm" len="sm"/>
+          </a:ln>
+          <a:effectLst>
+            <a:outerShdw blurRad="40000" dist="20000" dir="5400000" rotWithShape="0">
+              <a:srgbClr val="000000">
+                <a:alpha val="36470"/>
+              </a:srgbClr>
+            </a:outerShdw>
+          </a:effectLst>
+        </p:spPr>
+      </p:cxnSp>
+      <p:cxnSp>
+        <p:nvCxnSpPr>
+          <p:cNvPr id="150" name="Google Shape;97;p1">
+            <a:extLst>
+              <a:ext uri="{FF2B5EF4-FFF2-40B4-BE49-F238E27FC236}">
+                <a16:creationId xmlns:a16="http://schemas.microsoft.com/office/drawing/2014/main" id="{634446FE-9F35-55A5-80FF-45EDDF19EED1}"/>
+              </a:ext>
+            </a:extLst>
+          </p:cNvPr>
+          <p:cNvCxnSpPr/>
+          <p:nvPr/>
+        </p:nvCxnSpPr>
+        <p:spPr>
+          <a:xfrm>
+            <a:off x="31546800" y="28803600"/>
+            <a:ext cx="12344400" cy="0"/>
+          </a:xfrm>
+          <a:prstGeom prst="straightConnector1">
+            <a:avLst/>
+          </a:prstGeom>
+          <a:noFill/>
+          <a:ln w="25400" cap="flat" cmpd="sng">
+            <a:solidFill>
+              <a:schemeClr val="dk1"/>
+            </a:solidFill>
+            <a:prstDash val="solid"/>
+            <a:round/>
+            <a:headEnd type="none" w="sm" len="sm"/>
+            <a:tailEnd type="none" w="sm" len="sm"/>
+          </a:ln>
+          <a:effectLst>
+            <a:outerShdw blurRad="40000" dist="20000" dir="5400000" rotWithShape="0">
+              <a:srgbClr val="000000">
+                <a:alpha val="36470"/>
+              </a:srgbClr>
+            </a:outerShdw>
+          </a:effectLst>
+        </p:spPr>
+      </p:cxnSp>
+      <p:sp>
+        <p:nvSpPr>
+          <p:cNvPr id="153" name="Google Shape;96;p1">
+            <a:extLst>
+              <a:ext uri="{FF2B5EF4-FFF2-40B4-BE49-F238E27FC236}">
+                <a16:creationId xmlns:a16="http://schemas.microsoft.com/office/drawing/2014/main" id="{31FBF473-4E2F-0DFE-912B-26CFEC75EDC7}"/>
+              </a:ext>
+            </a:extLst>
+          </p:cNvPr>
+          <p:cNvSpPr txBox="1"/>
+          <p:nvPr/>
+        </p:nvSpPr>
+        <p:spPr>
+          <a:xfrm>
+            <a:off x="32762767" y="28928228"/>
+            <a:ext cx="9985433" cy="1055076"/>
+          </a:xfrm>
+          <a:prstGeom prst="rect">
+            <a:avLst/>
+          </a:prstGeom>
+          <a:solidFill>
+            <a:srgbClr val="FFFFFF"/>
+          </a:solidFill>
+          <a:ln w="9525" cap="flat" cmpd="sng">
+            <a:solidFill>
+              <a:srgbClr val="FFFFFF"/>
+            </a:solidFill>
+            <a:prstDash val="solid"/>
+            <a:round/>
+            <a:headEnd type="none" w="sm" len="sm"/>
+            <a:tailEnd type="none" w="sm" len="sm"/>
+          </a:ln>
+        </p:spPr>
+        <p:txBody>
+          <a:bodyPr spcFirstLastPara="1" wrap="square" lIns="104475" tIns="52250" rIns="104475" bIns="52250" anchor="t" anchorCtr="0">
+            <a:noAutofit/>
+          </a:bodyPr>
+          <a:lstStyle/>
+          <a:p>
+            <a:pPr marL="0" marR="0" lvl="0" indent="0" algn="ctr" rtl="0">
+              <a:lnSpc>
+                <a:spcPct val="100000"/>
+              </a:lnSpc>
+              <a:spcBef>
+                <a:spcPts val="0"/>
+              </a:spcBef>
+              <a:spcAft>
+                <a:spcPts val="0"/>
+              </a:spcAft>
+              <a:buClr>
+                <a:srgbClr val="000000"/>
+              </a:buClr>
+              <a:buSzPts val="6800"/>
+              <a:buFont typeface="Arial"/>
+              <a:buNone/>
+            </a:pPr>
+            <a:r>
+              <a:rPr lang="en-US" sz="4500" b="1" i="0" u="none" strike="noStrike" cap="none" dirty="0">
+                <a:solidFill>
+                  <a:srgbClr val="77933C"/>
+                </a:solidFill>
+                <a:latin typeface="Arial"/>
+                <a:ea typeface="Arial"/>
+                <a:cs typeface="Arial"/>
+                <a:sym typeface="Arial"/>
+              </a:rPr>
+              <a:t>References</a:t>
+            </a:r>
+            <a:endParaRPr sz="4500" b="0" i="0" u="none" strike="noStrike" cap="none" dirty="0">
+              <a:solidFill>
+                <a:schemeClr val="dk1"/>
+              </a:solidFill>
+              <a:latin typeface="Arial"/>
+              <a:ea typeface="Arial"/>
+              <a:cs typeface="Arial"/>
+              <a:sym typeface="Arial"/>
+            </a:endParaRPr>
+          </a:p>
+        </p:txBody>
+      </p:sp>
       <p:sp>
         <p:nvSpPr>
           <p:cNvPr id="176" name="TextBox 175">
@@ -22101,122 +22192,6 @@
           </a:p>
         </p:txBody>
       </p:sp>
-      <p:sp>
-        <p:nvSpPr>
-          <p:cNvPr id="3" name="TextBox 2">
-            <a:extLst>
-              <a:ext uri="{FF2B5EF4-FFF2-40B4-BE49-F238E27FC236}">
-                <a16:creationId xmlns:a16="http://schemas.microsoft.com/office/drawing/2014/main" id="{28A47484-EC7A-FCC1-3F0B-081CE98F86E5}"/>
-              </a:ext>
-            </a:extLst>
-          </p:cNvPr>
-          <p:cNvSpPr txBox="1"/>
-          <p:nvPr/>
-        </p:nvSpPr>
-        <p:spPr>
-          <a:xfrm>
-            <a:off x="31768534" y="18416250"/>
-            <a:ext cx="11887196" cy="2895664"/>
-          </a:xfrm>
-          <a:prstGeom prst="rect">
-            <a:avLst/>
-          </a:prstGeom>
-          <a:solidFill>
-            <a:srgbClr val="F2F6EA"/>
-          </a:solidFill>
-          <a:ln w="12700">
-            <a:solidFill>
-              <a:schemeClr val="tx1"/>
-            </a:solidFill>
-          </a:ln>
-        </p:spPr>
-        <p:txBody>
-          <a:bodyPr wrap="square" lIns="274320" tIns="274320" rIns="274320" bIns="274320">
-            <a:spAutoFit/>
-          </a:bodyPr>
-          <a:lstStyle/>
-          <a:p>
-            <a:pPr>
-              <a:spcAft>
-                <a:spcPts val="500"/>
-              </a:spcAft>
-            </a:pPr>
-            <a:r>
-              <a:rPr lang="en-US" sz="4000" b="1" dirty="0">
-                <a:solidFill>
-                  <a:srgbClr val="616A4E"/>
-                </a:solidFill>
-                <a:latin typeface="+mn-lt"/>
-                <a:ea typeface="Cascadia Mono SemiLight" panose="020B0609020000020004" pitchFamily="49" charset="0"/>
-                <a:cs typeface="Cascadia Mono SemiLight" panose="020B0609020000020004" pitchFamily="49" charset="0"/>
-              </a:rPr>
-              <a:t>Adapting to </a:t>
-            </a:r>
-            <a:r>
-              <a:rPr lang="en-US" sz="4000" b="1" dirty="0">
-                <a:solidFill>
-                  <a:srgbClr val="616A4E"/>
-                </a:solidFill>
-                <a:effectLst/>
-                <a:latin typeface="+mn-lt"/>
-                <a:ea typeface="Cascadia Mono SemiLight" panose="020B0609020000020004" pitchFamily="49" charset="0"/>
-                <a:cs typeface="Cascadia Mono SemiLight" panose="020B0609020000020004" pitchFamily="49" charset="0"/>
-              </a:rPr>
-              <a:t>Climate Change</a:t>
-            </a:r>
-          </a:p>
-          <a:p>
-            <a:pPr marL="457200" indent="-457200">
-              <a:spcAft>
-                <a:spcPts val="500"/>
-              </a:spcAft>
-              <a:buFont typeface="Arial" panose="020B0604020202020204" pitchFamily="34" charset="0"/>
-              <a:buChar char="•"/>
-            </a:pPr>
-            <a:r>
-              <a:rPr lang="en-US" sz="3600" dirty="0">
-                <a:solidFill>
-                  <a:schemeClr val="tx1"/>
-                </a:solidFill>
-                <a:latin typeface="+mn-lt"/>
-                <a:ea typeface="Cascadia Mono SemiLight" panose="020B0609020000020004" pitchFamily="49" charset="0"/>
-                <a:cs typeface="Cascadia Mono SemiLight" panose="020B0609020000020004" pitchFamily="49" charset="0"/>
-              </a:rPr>
-              <a:t>Investigate how changes in ocean temperature and salinity may impact population size, migration, and adaptation in Pacific acorn barnacle populations</a:t>
-            </a:r>
-          </a:p>
-        </p:txBody>
-      </p:sp>
-      <p:pic>
-        <p:nvPicPr>
-          <p:cNvPr id="134" name="Picture 133" descr="A rainbow colored map of a river&#10;&#10;Description automatically generated">
-            <a:extLst>
-              <a:ext uri="{FF2B5EF4-FFF2-40B4-BE49-F238E27FC236}">
-                <a16:creationId xmlns:a16="http://schemas.microsoft.com/office/drawing/2014/main" id="{72050FB8-50F0-45D9-4BB7-5332F27D1891}"/>
-              </a:ext>
-            </a:extLst>
-          </p:cNvPr>
-          <p:cNvPicPr>
-            <a:picLocks noChangeAspect="1"/>
-          </p:cNvPicPr>
-          <p:nvPr/>
-        </p:nvPicPr>
-        <p:blipFill>
-          <a:blip r:embed="rId8"/>
-          <a:stretch>
-            <a:fillRect/>
-          </a:stretch>
-        </p:blipFill>
-        <p:spPr>
-          <a:xfrm>
-            <a:off x="31784546" y="8531079"/>
-            <a:ext cx="5833872" cy="5833872"/>
-          </a:xfrm>
-          <a:prstGeom prst="rect">
-            <a:avLst/>
-          </a:prstGeom>
-        </p:spPr>
-      </p:pic>
       <p:sp>
         <p:nvSpPr>
           <p:cNvPr id="4" name="TextBox 3">
@@ -22554,9 +22529,186 @@
               </a:rPr>
               <a:t>Why: The Pacific Coast Range</a:t>
             </a:r>
+            <a:r>
+              <a:rPr lang="en-US" sz="4000" b="1" baseline="30000" dirty="0">
+                <a:solidFill>
+                  <a:srgbClr val="616A4E"/>
+                </a:solidFill>
+                <a:effectLst/>
+                <a:latin typeface="+mn-lt"/>
+                <a:ea typeface="Cascadia Mono SemiLight" panose="020B0609020000020004" pitchFamily="49" charset="0"/>
+                <a:cs typeface="Cascadia Mono SemiLight" panose="020B0609020000020004" pitchFamily="49" charset="0"/>
+              </a:rPr>
+              <a:t>2</a:t>
+            </a:r>
+            <a:endParaRPr lang="en-US" sz="4000" b="1" dirty="0">
+              <a:solidFill>
+                <a:srgbClr val="616A4E"/>
+              </a:solidFill>
+              <a:effectLst/>
+              <a:latin typeface="+mn-lt"/>
+              <a:ea typeface="Cascadia Mono SemiLight" panose="020B0609020000020004" pitchFamily="49" charset="0"/>
+              <a:cs typeface="Cascadia Mono SemiLight" panose="020B0609020000020004" pitchFamily="49" charset="0"/>
+            </a:endParaRPr>
           </a:p>
         </p:txBody>
       </p:sp>
+      <p:pic>
+        <p:nvPicPr>
+          <p:cNvPr id="206" name="Picture 205" descr="A red and white map&#10;&#10;Description automatically generated">
+            <a:extLst>
+              <a:ext uri="{FF2B5EF4-FFF2-40B4-BE49-F238E27FC236}">
+                <a16:creationId xmlns:a16="http://schemas.microsoft.com/office/drawing/2014/main" id="{ED3AD138-2F0F-F5E5-B991-C862CC38757D}"/>
+              </a:ext>
+            </a:extLst>
+          </p:cNvPr>
+          <p:cNvPicPr>
+            <a:picLocks noChangeAspect="1"/>
+          </p:cNvPicPr>
+          <p:nvPr/>
+        </p:nvPicPr>
+        <p:blipFill>
+          <a:blip r:embed="rId7"/>
+          <a:stretch>
+            <a:fillRect/>
+          </a:stretch>
+        </p:blipFill>
+        <p:spPr>
+          <a:xfrm>
+            <a:off x="37825228" y="9162288"/>
+            <a:ext cx="5830506" cy="5833872"/>
+          </a:xfrm>
+          <a:prstGeom prst="rect">
+            <a:avLst/>
+          </a:prstGeom>
+          <a:ln>
+            <a:solidFill>
+              <a:schemeClr val="tx1"/>
+            </a:solidFill>
+          </a:ln>
+        </p:spPr>
+      </p:pic>
+      <p:sp>
+        <p:nvSpPr>
+          <p:cNvPr id="3" name="TextBox 2">
+            <a:extLst>
+              <a:ext uri="{FF2B5EF4-FFF2-40B4-BE49-F238E27FC236}">
+                <a16:creationId xmlns:a16="http://schemas.microsoft.com/office/drawing/2014/main" id="{28A47484-EC7A-FCC1-3F0B-081CE98F86E5}"/>
+              </a:ext>
+            </a:extLst>
+          </p:cNvPr>
+          <p:cNvSpPr txBox="1"/>
+          <p:nvPr/>
+        </p:nvSpPr>
+        <p:spPr>
+          <a:xfrm>
+            <a:off x="31768534" y="19047459"/>
+            <a:ext cx="11880338" cy="3449662"/>
+          </a:xfrm>
+          <a:prstGeom prst="rect">
+            <a:avLst/>
+          </a:prstGeom>
+          <a:solidFill>
+            <a:srgbClr val="F2F6EA"/>
+          </a:solidFill>
+          <a:ln w="12700">
+            <a:solidFill>
+              <a:schemeClr val="tx1"/>
+            </a:solidFill>
+          </a:ln>
+        </p:spPr>
+        <p:txBody>
+          <a:bodyPr wrap="square" lIns="274320" tIns="274320" rIns="274320" bIns="274320">
+            <a:spAutoFit/>
+          </a:bodyPr>
+          <a:lstStyle/>
+          <a:p>
+            <a:pPr>
+              <a:spcAft>
+                <a:spcPts val="500"/>
+              </a:spcAft>
+            </a:pPr>
+            <a:r>
+              <a:rPr lang="en-US" sz="4000" b="1" dirty="0">
+                <a:solidFill>
+                  <a:srgbClr val="616A4E"/>
+                </a:solidFill>
+                <a:latin typeface="+mn-lt"/>
+                <a:ea typeface="Cascadia Mono SemiLight" panose="020B0609020000020004" pitchFamily="49" charset="0"/>
+                <a:cs typeface="Cascadia Mono SemiLight" panose="020B0609020000020004" pitchFamily="49" charset="0"/>
+              </a:rPr>
+              <a:t>Adapting to </a:t>
+            </a:r>
+            <a:r>
+              <a:rPr lang="en-US" sz="4000" b="1" dirty="0">
+                <a:solidFill>
+                  <a:srgbClr val="616A4E"/>
+                </a:solidFill>
+                <a:effectLst/>
+                <a:latin typeface="+mn-lt"/>
+                <a:ea typeface="Cascadia Mono SemiLight" panose="020B0609020000020004" pitchFamily="49" charset="0"/>
+                <a:cs typeface="Cascadia Mono SemiLight" panose="020B0609020000020004" pitchFamily="49" charset="0"/>
+              </a:rPr>
+              <a:t>Climate Change</a:t>
+            </a:r>
+          </a:p>
+          <a:p>
+            <a:pPr marL="457200" indent="-457200">
+              <a:spcAft>
+                <a:spcPts val="500"/>
+              </a:spcAft>
+              <a:buFont typeface="Arial" panose="020B0604020202020204" pitchFamily="34" charset="0"/>
+              <a:buChar char="•"/>
+            </a:pPr>
+            <a:r>
+              <a:rPr lang="en-US" sz="3600" dirty="0">
+                <a:solidFill>
+                  <a:schemeClr val="tx1"/>
+                </a:solidFill>
+                <a:latin typeface="+mn-lt"/>
+                <a:ea typeface="Cascadia Mono SemiLight" panose="020B0609020000020004" pitchFamily="49" charset="0"/>
+                <a:cs typeface="Cascadia Mono SemiLight" panose="020B0609020000020004" pitchFamily="49" charset="0"/>
+              </a:rPr>
+              <a:t>Investigate how changes in ocean temperature and salinity may impact population size, adaptation, and population structure across the native range of the Pacific acorn barnacle</a:t>
+            </a:r>
+          </a:p>
+        </p:txBody>
+      </p:sp>
+      <p:pic>
+        <p:nvPicPr>
+          <p:cNvPr id="134" name="Picture 133" descr="A rainbow colored map of a river&#10;&#10;Description automatically generated">
+            <a:extLst>
+              <a:ext uri="{FF2B5EF4-FFF2-40B4-BE49-F238E27FC236}">
+                <a16:creationId xmlns:a16="http://schemas.microsoft.com/office/drawing/2014/main" id="{72050FB8-50F0-45D9-4BB7-5332F27D1891}"/>
+              </a:ext>
+            </a:extLst>
+          </p:cNvPr>
+          <p:cNvPicPr>
+            <a:picLocks noChangeAspect="1"/>
+          </p:cNvPicPr>
+          <p:nvPr/>
+        </p:nvPicPr>
+        <p:blipFill>
+          <a:blip r:embed="rId8"/>
+          <a:stretch>
+            <a:fillRect/>
+          </a:stretch>
+        </p:blipFill>
+        <p:spPr>
+          <a:xfrm>
+            <a:off x="31784537" y="9162288"/>
+            <a:ext cx="5830506" cy="5833872"/>
+          </a:xfrm>
+          <a:prstGeom prst="rect">
+            <a:avLst/>
+          </a:prstGeom>
+          <a:ln>
+            <a:solidFill>
+              <a:schemeClr val="tx1"/>
+            </a:solidFill>
+          </a:ln>
+        </p:spPr>
+      </p:pic>
       <p:sp>
         <p:nvSpPr>
           <p:cNvPr id="22" name="TextBox 21">
@@ -22571,8 +22723,8 @@
         </p:nvSpPr>
         <p:spPr>
           <a:xfrm>
-            <a:off x="31775396" y="14664961"/>
-            <a:ext cx="11887200" cy="3513782"/>
+            <a:off x="31775392" y="15296170"/>
+            <a:ext cx="11880342" cy="3513782"/>
           </a:xfrm>
           <a:prstGeom prst="rect">
             <a:avLst/>
@@ -23198,8 +23350,8 @@
         </p:nvSpPr>
         <p:spPr>
           <a:xfrm>
-            <a:off x="12573000" y="17355312"/>
-            <a:ext cx="9262872" cy="3511218"/>
+            <a:off x="12573000" y="17324535"/>
+            <a:ext cx="9262872" cy="3572773"/>
           </a:xfrm>
           <a:prstGeom prst="rect">
             <a:avLst/>
@@ -23254,7 +23406,7 @@
                 <a:cs typeface="Cascadia Mono SemiLight" panose="020B0609020000020004" pitchFamily="49" charset="0"/>
                 <a:sym typeface="Arial"/>
               </a:rPr>
-              <a:t>The Effects of Environmental Variables </a:t>
+              <a:t>The Effects of Environmental Variables</a:t>
             </a:r>
           </a:p>
           <a:p>
@@ -23430,7 +23582,7 @@
         </p:blipFill>
         <p:spPr>
           <a:xfrm>
-            <a:off x="12573000" y="21022056"/>
+            <a:off x="12573000" y="21131784"/>
             <a:ext cx="9258318" cy="6912878"/>
           </a:xfrm>
           <a:prstGeom prst="rect">
@@ -23492,7 +23644,7 @@
         <p:spPr>
           <a:xfrm>
             <a:off x="31775400" y="5971336"/>
-            <a:ext cx="11887200" cy="2405787"/>
+            <a:ext cx="11887200" cy="2959785"/>
           </a:xfrm>
           <a:prstGeom prst="rect">
             <a:avLst/>
@@ -23547,7 +23699,7 @@
                 <a:ea typeface="Cascadia Mono SemiLight" panose="020B0609020000020004" pitchFamily="49" charset="0"/>
                 <a:cs typeface="Cascadia Mono SemiLight" panose="020B0609020000020004" pitchFamily="49" charset="0"/>
               </a:rPr>
-              <a:t>Add temperature in addition to salinity</a:t>
+              <a:t>Add other environmental conditions that impact the Pacific acorn barnacle such as temperature and tides</a:t>
             </a:r>
           </a:p>
           <a:p>
@@ -23572,6 +23724,814 @@
           </a:p>
         </p:txBody>
       </p:sp>
+      <p:sp>
+        <p:nvSpPr>
+          <p:cNvPr id="156" name="Google Shape;114;p1">
+            <a:extLst>
+              <a:ext uri="{FF2B5EF4-FFF2-40B4-BE49-F238E27FC236}">
+                <a16:creationId xmlns:a16="http://schemas.microsoft.com/office/drawing/2014/main" id="{E23C6F3B-144A-BE51-A5DF-21E43D2B5DC4}"/>
+              </a:ext>
+            </a:extLst>
+          </p:cNvPr>
+          <p:cNvSpPr txBox="1"/>
+          <p:nvPr/>
+        </p:nvSpPr>
+        <p:spPr>
+          <a:xfrm>
+            <a:off x="31674818" y="29604771"/>
+            <a:ext cx="11887200" cy="3127871"/>
+          </a:xfrm>
+          <a:prstGeom prst="rect">
+            <a:avLst/>
+          </a:prstGeom>
+          <a:noFill/>
+          <a:ln>
+            <a:noFill/>
+          </a:ln>
+        </p:spPr>
+        <p:txBody>
+          <a:bodyPr spcFirstLastPara="1" wrap="square" lIns="91425" tIns="45700" rIns="91425" bIns="45700" anchor="t" anchorCtr="0">
+            <a:noAutofit/>
+          </a:bodyPr>
+          <a:lstStyle/>
+          <a:p>
+            <a:pPr algn="r"/>
+            <a:r>
+              <a:rPr lang="en-US" sz="1100" dirty="0">
+                <a:effectLst/>
+                <a:latin typeface="+mj-lt"/>
+              </a:rPr>
+              <a:t>1.</a:t>
+            </a:r>
+          </a:p>
+          <a:p>
+            <a:r>
+              <a:rPr lang="en-US" sz="1100" b="0" i="0" dirty="0" err="1">
+                <a:solidFill>
+                  <a:srgbClr val="000000"/>
+                </a:solidFill>
+                <a:effectLst/>
+                <a:latin typeface="+mj-lt"/>
+              </a:rPr>
+              <a:t>iNaturalist</a:t>
+            </a:r>
+            <a:r>
+              <a:rPr lang="en-US" sz="1100" b="0" i="0" dirty="0">
+                <a:solidFill>
+                  <a:srgbClr val="000000"/>
+                </a:solidFill>
+                <a:effectLst/>
+                <a:latin typeface="+mj-lt"/>
+              </a:rPr>
+              <a:t> community. Observations of </a:t>
+            </a:r>
+            <a:r>
+              <a:rPr lang="en-US" sz="1100" b="0" i="1" dirty="0">
+                <a:solidFill>
+                  <a:srgbClr val="000000"/>
+                </a:solidFill>
+                <a:effectLst/>
+                <a:latin typeface="+mj-lt"/>
+              </a:rPr>
+              <a:t>Balanus glandula</a:t>
+            </a:r>
+            <a:r>
+              <a:rPr lang="en-US" sz="1100" b="0" i="0" dirty="0">
+                <a:solidFill>
+                  <a:srgbClr val="000000"/>
+                </a:solidFill>
+                <a:effectLst/>
+                <a:latin typeface="+mj-lt"/>
+              </a:rPr>
+              <a:t> from Mar del Plata, Provincia de Buenos Aires, Argentina observed on Nov 6, 2021. Exported from https://www.inaturalist.org on 11/6/2024</a:t>
+            </a:r>
+            <a:endParaRPr lang="en-US" sz="1100" b="0" i="0" u="none" strike="noStrike" cap="none" dirty="0">
+              <a:solidFill>
+                <a:schemeClr val="dk1"/>
+              </a:solidFill>
+              <a:latin typeface="+mj-lt"/>
+              <a:ea typeface="Arial"/>
+              <a:cs typeface="Arial"/>
+              <a:sym typeface="Arial"/>
+            </a:endParaRPr>
+          </a:p>
+          <a:p>
+            <a:pPr algn="r"/>
+            <a:r>
+              <a:rPr lang="en-US" sz="1100" dirty="0">
+                <a:effectLst/>
+                <a:latin typeface="+mj-lt"/>
+              </a:rPr>
+              <a:t>2.</a:t>
+            </a:r>
+          </a:p>
+          <a:p>
+            <a:r>
+              <a:rPr lang="en-US" sz="1100" dirty="0">
+                <a:effectLst/>
+                <a:latin typeface="+mj-lt"/>
+              </a:rPr>
+              <a:t>Wares, J. P., Strand, A. E. &amp; </a:t>
+            </a:r>
+            <a:r>
+              <a:rPr lang="en-US" sz="1100" dirty="0" err="1">
+                <a:effectLst/>
+                <a:latin typeface="+mj-lt"/>
+              </a:rPr>
+              <a:t>Sotka</a:t>
+            </a:r>
+            <a:r>
+              <a:rPr lang="en-US" sz="1100" dirty="0">
+                <a:effectLst/>
+                <a:latin typeface="+mj-lt"/>
+              </a:rPr>
+              <a:t>, E. E. Diversity, divergence and density: How habitat and hybrid zone dynamics maintain a genomic cline in an intertidal barnacle. </a:t>
+            </a:r>
+            <a:r>
+              <a:rPr lang="en-US" sz="1100" i="1" dirty="0">
+                <a:effectLst/>
+                <a:latin typeface="+mj-lt"/>
+              </a:rPr>
+              <a:t>Journal of Biogeography</a:t>
+            </a:r>
+            <a:r>
+              <a:rPr lang="en-US" sz="1100" dirty="0">
+                <a:effectLst/>
+                <a:latin typeface="+mj-lt"/>
+              </a:rPr>
+              <a:t> </a:t>
+            </a:r>
+            <a:r>
+              <a:rPr lang="en-US" sz="1100" b="1" dirty="0">
+                <a:effectLst/>
+                <a:latin typeface="+mj-lt"/>
+              </a:rPr>
+              <a:t>48</a:t>
+            </a:r>
+            <a:r>
+              <a:rPr lang="en-US" sz="1100" dirty="0">
+                <a:effectLst/>
+                <a:latin typeface="+mj-lt"/>
+              </a:rPr>
+              <a:t>, 2174–2185 (2021).</a:t>
+            </a:r>
+          </a:p>
+          <a:p>
+            <a:pPr algn="r"/>
+            <a:r>
+              <a:rPr lang="en-US" sz="1100" dirty="0">
+                <a:effectLst/>
+                <a:latin typeface="+mj-lt"/>
+              </a:rPr>
+              <a:t>3.</a:t>
+            </a:r>
+          </a:p>
+          <a:p>
+            <a:r>
+              <a:rPr lang="en-US" sz="1100" dirty="0">
+                <a:effectLst/>
+                <a:latin typeface="+mj-lt"/>
+              </a:rPr>
+              <a:t>Haller, B. C. &amp; Messer, P. W. </a:t>
+            </a:r>
+            <a:r>
+              <a:rPr lang="en-US" sz="1100" dirty="0" err="1">
+                <a:effectLst/>
+                <a:latin typeface="+mj-lt"/>
+              </a:rPr>
+              <a:t>SLiM</a:t>
+            </a:r>
+            <a:r>
+              <a:rPr lang="en-US" sz="1100" dirty="0">
+                <a:effectLst/>
+                <a:latin typeface="+mj-lt"/>
+              </a:rPr>
+              <a:t> 4: Multispecies Eco-Evolutionary Modeling. </a:t>
+            </a:r>
+            <a:r>
+              <a:rPr lang="en-US" sz="1100" i="1" dirty="0">
+                <a:effectLst/>
+                <a:latin typeface="+mj-lt"/>
+              </a:rPr>
+              <a:t>The American Naturalist</a:t>
+            </a:r>
+            <a:r>
+              <a:rPr lang="en-US" sz="1100" dirty="0">
+                <a:effectLst/>
+                <a:latin typeface="+mj-lt"/>
+              </a:rPr>
+              <a:t> </a:t>
+            </a:r>
+            <a:r>
+              <a:rPr lang="en-US" sz="1100" b="1" dirty="0">
+                <a:effectLst/>
+                <a:latin typeface="+mj-lt"/>
+              </a:rPr>
+              <a:t>201</a:t>
+            </a:r>
+            <a:r>
+              <a:rPr lang="en-US" sz="1100" dirty="0">
+                <a:effectLst/>
+                <a:latin typeface="+mj-lt"/>
+              </a:rPr>
+              <a:t>, E127–E139 (2023).</a:t>
+            </a:r>
+          </a:p>
+          <a:p>
+            <a:pPr algn="r"/>
+            <a:r>
+              <a:rPr lang="en-US" sz="1100" dirty="0">
+                <a:effectLst/>
+                <a:latin typeface="+mj-lt"/>
+              </a:rPr>
+              <a:t>4.</a:t>
+            </a:r>
+          </a:p>
+          <a:p>
+            <a:r>
+              <a:rPr lang="en-US" sz="1100" dirty="0">
+                <a:effectLst/>
+                <a:latin typeface="+mj-lt"/>
+              </a:rPr>
+              <a:t>Berger, M. S., Darrah, A. J. &amp; </a:t>
+            </a:r>
+            <a:r>
+              <a:rPr lang="en-US" sz="1100" dirty="0" err="1">
+                <a:effectLst/>
+                <a:latin typeface="+mj-lt"/>
+              </a:rPr>
+              <a:t>Emlet</a:t>
+            </a:r>
+            <a:r>
+              <a:rPr lang="en-US" sz="1100" dirty="0">
+                <a:effectLst/>
+                <a:latin typeface="+mj-lt"/>
+              </a:rPr>
+              <a:t>, R. B. Spatial and temporal variability of early post-settlement survivorship and growth in the barnacle Balanus glandula along an estuarine gradient. </a:t>
+            </a:r>
+            <a:r>
+              <a:rPr lang="en-US" sz="1100" i="1" dirty="0">
+                <a:effectLst/>
+                <a:latin typeface="+mj-lt"/>
+              </a:rPr>
+              <a:t>Journal of Experimental Marine Biology and Ecology</a:t>
+            </a:r>
+            <a:r>
+              <a:rPr lang="en-US" sz="1100" dirty="0">
+                <a:effectLst/>
+                <a:latin typeface="+mj-lt"/>
+              </a:rPr>
+              <a:t> </a:t>
+            </a:r>
+            <a:r>
+              <a:rPr lang="en-US" sz="1100" b="1" dirty="0">
+                <a:effectLst/>
+                <a:latin typeface="+mj-lt"/>
+              </a:rPr>
+              <a:t>336</a:t>
+            </a:r>
+            <a:r>
+              <a:rPr lang="en-US" sz="1100" dirty="0">
+                <a:effectLst/>
+                <a:latin typeface="+mj-lt"/>
+              </a:rPr>
+              <a:t>, 74–87 (2006).</a:t>
+            </a:r>
+          </a:p>
+          <a:p>
+            <a:pPr algn="r"/>
+            <a:r>
+              <a:rPr lang="en-US" sz="1100" dirty="0">
+                <a:effectLst/>
+                <a:latin typeface="+mj-lt"/>
+              </a:rPr>
+              <a:t>5.</a:t>
+            </a:r>
+          </a:p>
+          <a:p>
+            <a:r>
+              <a:rPr lang="en-US" sz="1100" dirty="0">
+                <a:effectLst/>
+                <a:latin typeface="+mj-lt"/>
+              </a:rPr>
+              <a:t>Berger, M. Reproduction of the intertidal barnacle Balanus glandula along an estuarine gradient. </a:t>
+            </a:r>
+            <a:r>
+              <a:rPr lang="en-US" sz="1100" i="1" dirty="0">
+                <a:effectLst/>
+                <a:latin typeface="+mj-lt"/>
+              </a:rPr>
+              <a:t>Marine Ecology</a:t>
+            </a:r>
+            <a:r>
+              <a:rPr lang="en-US" sz="1100" dirty="0">
+                <a:effectLst/>
+                <a:latin typeface="+mj-lt"/>
+              </a:rPr>
+              <a:t> </a:t>
+            </a:r>
+            <a:r>
+              <a:rPr lang="en-US" sz="1100" b="1" dirty="0">
+                <a:effectLst/>
+                <a:latin typeface="+mj-lt"/>
+              </a:rPr>
+              <a:t>30</a:t>
+            </a:r>
+            <a:r>
+              <a:rPr lang="en-US" sz="1100" dirty="0">
+                <a:effectLst/>
+                <a:latin typeface="+mj-lt"/>
+              </a:rPr>
+              <a:t>, 346–353 (2009).</a:t>
+            </a:r>
+          </a:p>
+          <a:p>
+            <a:pPr algn="r"/>
+            <a:r>
+              <a:rPr lang="en-US" sz="1100" dirty="0">
+                <a:latin typeface="+mj-lt"/>
+              </a:rPr>
+              <a:t>6</a:t>
+            </a:r>
+            <a:r>
+              <a:rPr lang="en-US" sz="1100" dirty="0">
+                <a:effectLst/>
+                <a:latin typeface="+mj-lt"/>
+              </a:rPr>
+              <a:t>.</a:t>
+            </a:r>
+          </a:p>
+          <a:p>
+            <a:r>
+              <a:rPr lang="en-US" sz="1100" dirty="0">
+                <a:effectLst/>
+                <a:latin typeface="+mj-lt"/>
+              </a:rPr>
+              <a:t>Conroy, T., Sutherland, D. A. &amp; Ralston, D. K. Estuarine Exchange Flow Variability in a Seasonal, Segmented Estuary. </a:t>
+            </a:r>
+            <a:r>
+              <a:rPr lang="en-US" sz="1100" i="1" dirty="0">
+                <a:effectLst/>
+                <a:latin typeface="+mj-lt"/>
+              </a:rPr>
+              <a:t>Journal of Physical Oceanography, 50(3), 595-613</a:t>
+            </a:r>
+            <a:r>
+              <a:rPr lang="en-US" sz="1100" dirty="0">
+                <a:effectLst/>
+                <a:latin typeface="+mj-lt"/>
+              </a:rPr>
+              <a:t> </a:t>
+            </a:r>
+            <a:r>
+              <a:rPr lang="en-US" sz="1100" b="1" dirty="0">
+                <a:effectLst/>
+                <a:latin typeface="+mj-lt"/>
+              </a:rPr>
+              <a:t>50</a:t>
+            </a:r>
+            <a:r>
+              <a:rPr lang="en-US" sz="1100" dirty="0">
+                <a:effectLst/>
+                <a:latin typeface="+mj-lt"/>
+              </a:rPr>
+              <a:t>, 595–613 (2020).</a:t>
+            </a:r>
+          </a:p>
+          <a:p>
+            <a:pPr algn="r"/>
+            <a:r>
+              <a:rPr lang="en-US" sz="1100" dirty="0">
+                <a:effectLst/>
+                <a:latin typeface="+mj-lt"/>
+              </a:rPr>
+              <a:t>7.</a:t>
+            </a:r>
+          </a:p>
+          <a:p>
+            <a:r>
+              <a:rPr lang="en-US" sz="1100" dirty="0">
+                <a:effectLst/>
+                <a:latin typeface="+mj-lt"/>
+              </a:rPr>
+              <a:t>Chevy, E. T. </a:t>
+            </a:r>
+            <a:r>
+              <a:rPr lang="en-US" sz="1100" i="1" dirty="0">
+                <a:effectLst/>
+                <a:latin typeface="+mj-lt"/>
+              </a:rPr>
+              <a:t>et al.</a:t>
+            </a:r>
+            <a:r>
+              <a:rPr lang="en-US" sz="1100" dirty="0">
+                <a:effectLst/>
+                <a:latin typeface="+mj-lt"/>
+              </a:rPr>
+              <a:t> Population genetics meets ecology: a guide to individual-based simulations in continuous landscapes. Preprint at </a:t>
+            </a:r>
+            <a:r>
+              <a:rPr lang="en-US" sz="1100" dirty="0">
+                <a:effectLst/>
+                <a:latin typeface="+mj-lt"/>
+                <a:hlinkClick r:id="rId18"/>
+              </a:rPr>
+              <a:t>https://doi.org/10.1101/2024.07.24.604988</a:t>
+            </a:r>
+            <a:r>
+              <a:rPr lang="en-US" sz="1100" dirty="0">
+                <a:effectLst/>
+                <a:latin typeface="+mj-lt"/>
+              </a:rPr>
+              <a:t> (2024)</a:t>
+            </a:r>
+          </a:p>
+        </p:txBody>
+      </p:sp>
+      <p:sp>
+        <p:nvSpPr>
+          <p:cNvPr id="10" name="Rectangle 2">
+            <a:extLst>
+              <a:ext uri="{FF2B5EF4-FFF2-40B4-BE49-F238E27FC236}">
+                <a16:creationId xmlns:a16="http://schemas.microsoft.com/office/drawing/2014/main" id="{C1272931-4D3B-945E-B8CD-067E72189DFF}"/>
+              </a:ext>
+            </a:extLst>
+          </p:cNvPr>
+          <p:cNvSpPr>
+            <a:spLocks noChangeArrowheads="1"/>
+          </p:cNvSpPr>
+          <p:nvPr/>
+        </p:nvSpPr>
+        <p:spPr bwMode="auto">
+          <a:xfrm>
+            <a:off x="0" y="0"/>
+            <a:ext cx="43891200" cy="0"/>
+          </a:xfrm>
+          <a:prstGeom prst="rect">
+            <a:avLst/>
+          </a:prstGeom>
+          <a:solidFill>
+            <a:srgbClr val="FFFFFF"/>
+          </a:solidFill>
+          <a:ln>
+            <a:noFill/>
+          </a:ln>
+          <a:effectLst/>
+          <a:extLst>
+            <a:ext uri="{91240B29-F687-4F45-9708-019B960494DF}">
+              <a14:hiddenLine xmlns:a14="http://schemas.microsoft.com/office/drawing/2010/main" w="9525">
+                <a:solidFill>
+                  <a:schemeClr val="tx1"/>
+                </a:solidFill>
+                <a:miter lim="800000"/>
+                <a:headEnd/>
+                <a:tailEnd/>
+              </a14:hiddenLine>
+            </a:ext>
+            <a:ext uri="{AF507438-7753-43E0-B8FC-AC1667EBCBE1}">
+              <a14:hiddenEffects xmlns:a14="http://schemas.microsoft.com/office/drawing/2010/main">
+                <a:effectLst>
+                  <a:outerShdw dist="35921" dir="2700000" algn="ctr" rotWithShape="0">
+                    <a:schemeClr val="bg2"/>
+                  </a:outerShdw>
+                </a:effectLst>
+              </a14:hiddenEffects>
+            </a:ext>
+          </a:extLst>
+        </p:spPr>
+        <p:txBody>
+          <a:bodyPr vert="horz" wrap="none" lIns="91440" tIns="45720" rIns="91440" bIns="45720" numCol="1" anchor="ctr" anchorCtr="0" compatLnSpc="1">
+            <a:prstTxWarp prst="textNoShape">
+              <a:avLst/>
+            </a:prstTxWarp>
+            <a:spAutoFit/>
+          </a:bodyPr>
+          <a:lstStyle>
+            <a:lvl1pPr eaLnBrk="0" fontAlgn="base" hangingPunct="0">
+              <a:spcBef>
+                <a:spcPct val="0"/>
+              </a:spcBef>
+              <a:spcAft>
+                <a:spcPct val="0"/>
+              </a:spcAft>
+              <a:defRPr>
+                <a:solidFill>
+                  <a:schemeClr val="tx1"/>
+                </a:solidFill>
+                <a:latin typeface="Arial" panose="020B0604020202020204" pitchFamily="34" charset="0"/>
+              </a:defRPr>
+            </a:lvl1pPr>
+            <a:lvl2pPr marL="457200" eaLnBrk="0" fontAlgn="base" hangingPunct="0">
+              <a:spcBef>
+                <a:spcPct val="0"/>
+              </a:spcBef>
+              <a:spcAft>
+                <a:spcPct val="0"/>
+              </a:spcAft>
+              <a:defRPr>
+                <a:solidFill>
+                  <a:schemeClr val="tx1"/>
+                </a:solidFill>
+                <a:latin typeface="Arial" panose="020B0604020202020204" pitchFamily="34" charset="0"/>
+              </a:defRPr>
+            </a:lvl2pPr>
+            <a:lvl3pPr marL="914400" eaLnBrk="0" fontAlgn="base" hangingPunct="0">
+              <a:spcBef>
+                <a:spcPct val="0"/>
+              </a:spcBef>
+              <a:spcAft>
+                <a:spcPct val="0"/>
+              </a:spcAft>
+              <a:defRPr>
+                <a:solidFill>
+                  <a:schemeClr val="tx1"/>
+                </a:solidFill>
+                <a:latin typeface="Arial" panose="020B0604020202020204" pitchFamily="34" charset="0"/>
+              </a:defRPr>
+            </a:lvl3pPr>
+            <a:lvl4pPr marL="1371600" eaLnBrk="0" fontAlgn="base" hangingPunct="0">
+              <a:spcBef>
+                <a:spcPct val="0"/>
+              </a:spcBef>
+              <a:spcAft>
+                <a:spcPct val="0"/>
+              </a:spcAft>
+              <a:defRPr>
+                <a:solidFill>
+                  <a:schemeClr val="tx1"/>
+                </a:solidFill>
+                <a:latin typeface="Arial" panose="020B0604020202020204" pitchFamily="34" charset="0"/>
+              </a:defRPr>
+            </a:lvl4pPr>
+            <a:lvl5pPr marL="1828800" eaLnBrk="0" fontAlgn="base" hangingPunct="0">
+              <a:spcBef>
+                <a:spcPct val="0"/>
+              </a:spcBef>
+              <a:spcAft>
+                <a:spcPct val="0"/>
+              </a:spcAft>
+              <a:defRPr>
+                <a:solidFill>
+                  <a:schemeClr val="tx1"/>
+                </a:solidFill>
+                <a:latin typeface="Arial" panose="020B0604020202020204" pitchFamily="34" charset="0"/>
+              </a:defRPr>
+            </a:lvl5pPr>
+            <a:lvl6pPr marL="2286000" eaLnBrk="0" fontAlgn="base" hangingPunct="0">
+              <a:spcBef>
+                <a:spcPct val="0"/>
+              </a:spcBef>
+              <a:spcAft>
+                <a:spcPct val="0"/>
+              </a:spcAft>
+              <a:defRPr>
+                <a:solidFill>
+                  <a:schemeClr val="tx1"/>
+                </a:solidFill>
+                <a:latin typeface="Arial" panose="020B0604020202020204" pitchFamily="34" charset="0"/>
+              </a:defRPr>
+            </a:lvl6pPr>
+            <a:lvl7pPr marL="2743200" eaLnBrk="0" fontAlgn="base" hangingPunct="0">
+              <a:spcBef>
+                <a:spcPct val="0"/>
+              </a:spcBef>
+              <a:spcAft>
+                <a:spcPct val="0"/>
+              </a:spcAft>
+              <a:defRPr>
+                <a:solidFill>
+                  <a:schemeClr val="tx1"/>
+                </a:solidFill>
+                <a:latin typeface="Arial" panose="020B0604020202020204" pitchFamily="34" charset="0"/>
+              </a:defRPr>
+            </a:lvl7pPr>
+            <a:lvl8pPr marL="3200400" eaLnBrk="0" fontAlgn="base" hangingPunct="0">
+              <a:spcBef>
+                <a:spcPct val="0"/>
+              </a:spcBef>
+              <a:spcAft>
+                <a:spcPct val="0"/>
+              </a:spcAft>
+              <a:defRPr>
+                <a:solidFill>
+                  <a:schemeClr val="tx1"/>
+                </a:solidFill>
+                <a:latin typeface="Arial" panose="020B0604020202020204" pitchFamily="34" charset="0"/>
+              </a:defRPr>
+            </a:lvl8pPr>
+            <a:lvl9pPr marL="3657600" eaLnBrk="0" fontAlgn="base" hangingPunct="0">
+              <a:spcBef>
+                <a:spcPct val="0"/>
+              </a:spcBef>
+              <a:spcAft>
+                <a:spcPct val="0"/>
+              </a:spcAft>
+              <a:defRPr>
+                <a:solidFill>
+                  <a:schemeClr val="tx1"/>
+                </a:solidFill>
+                <a:latin typeface="Arial" panose="020B0604020202020204" pitchFamily="34" charset="0"/>
+              </a:defRPr>
+            </a:lvl9pPr>
+          </a:lstStyle>
+          <a:p>
+            <a:pPr marL="0" marR="0" lvl="0" indent="0" algn="l" defTabSz="914400" rtl="0" eaLnBrk="0" fontAlgn="base" latinLnBrk="0" hangingPunct="0">
+              <a:lnSpc>
+                <a:spcPct val="100000"/>
+              </a:lnSpc>
+              <a:spcBef>
+                <a:spcPct val="0"/>
+              </a:spcBef>
+              <a:spcAft>
+                <a:spcPct val="0"/>
+              </a:spcAft>
+              <a:buClrTx/>
+              <a:buSzTx/>
+              <a:buFontTx/>
+              <a:buNone/>
+              <a:tabLst/>
+            </a:pPr>
+            <a:r>
+              <a:rPr kumimoji="0" lang="en-US" altLang="en-US" sz="1000" b="0" i="0" u="none" strike="noStrike" cap="none" normalizeH="0" baseline="0">
+                <a:ln>
+                  <a:noFill/>
+                </a:ln>
+                <a:solidFill>
+                  <a:srgbClr val="333333"/>
+                </a:solidFill>
+                <a:effectLst/>
+                <a:latin typeface="Lato" panose="020F0502020204030203" pitchFamily="34" charset="0"/>
+              </a:rPr>
+              <a:t>Mar del Plata, Provincia de Buenos Aires, Argentina</a:t>
+            </a:r>
+          </a:p>
+          <a:p>
+            <a:pPr marL="0" marR="0" lvl="0" indent="0" algn="l" defTabSz="914400" rtl="0" eaLnBrk="0" fontAlgn="base" latinLnBrk="0" hangingPunct="0">
+              <a:lnSpc>
+                <a:spcPct val="100000"/>
+              </a:lnSpc>
+              <a:spcBef>
+                <a:spcPct val="0"/>
+              </a:spcBef>
+              <a:spcAft>
+                <a:spcPct val="0"/>
+              </a:spcAft>
+              <a:buClrTx/>
+              <a:buSzTx/>
+              <a:buFontTx/>
+              <a:buNone/>
+              <a:tabLst/>
+            </a:pPr>
+            <a:br>
+              <a:rPr kumimoji="0" lang="en-US" altLang="en-US" sz="1000" b="0" i="0" u="none" strike="noStrike" cap="none" normalizeH="0" baseline="0">
+                <a:ln>
+                  <a:noFill/>
+                </a:ln>
+                <a:solidFill>
+                  <a:srgbClr val="333333"/>
+                </a:solidFill>
+                <a:effectLst/>
+                <a:latin typeface="Lato" panose="020F0502020204030203" pitchFamily="34" charset="0"/>
+              </a:rPr>
+            </a:br>
+            <a:endParaRPr kumimoji="0" lang="en-US" altLang="en-US" sz="1800" b="0" i="0" u="none" strike="noStrike" cap="none" normalizeH="0" baseline="0">
+              <a:ln>
+                <a:noFill/>
+              </a:ln>
+              <a:solidFill>
+                <a:schemeClr val="tx1"/>
+              </a:solidFill>
+              <a:effectLst/>
+              <a:latin typeface="Arial" panose="020B0604020202020204" pitchFamily="34" charset="0"/>
+            </a:endParaRPr>
+          </a:p>
+        </p:txBody>
+      </p:sp>
+      <p:sp>
+        <p:nvSpPr>
+          <p:cNvPr id="11" name="TextBox 10">
+            <a:extLst>
+              <a:ext uri="{FF2B5EF4-FFF2-40B4-BE49-F238E27FC236}">
+                <a16:creationId xmlns:a16="http://schemas.microsoft.com/office/drawing/2014/main" id="{DC1FDF56-11EB-E851-9055-018BF81BB6DF}"/>
+              </a:ext>
+            </a:extLst>
+          </p:cNvPr>
+          <p:cNvSpPr txBox="1"/>
+          <p:nvPr/>
+        </p:nvSpPr>
+        <p:spPr>
+          <a:xfrm>
+            <a:off x="11542005" y="11763460"/>
+            <a:ext cx="457200" cy="457200"/>
+          </a:xfrm>
+          <a:prstGeom prst="rect">
+            <a:avLst/>
+          </a:prstGeom>
+          <a:solidFill>
+            <a:srgbClr val="D7E4BD">
+              <a:alpha val="69804"/>
+            </a:srgbClr>
+          </a:solidFill>
+          <a:ln w="25400">
+            <a:solidFill>
+              <a:schemeClr val="tx1"/>
+            </a:solidFill>
+          </a:ln>
+        </p:spPr>
+        <p:txBody>
+          <a:bodyPr wrap="square" lIns="91440" tIns="91440" rIns="91440" bIns="91440" anchor="b">
+            <a:noAutofit/>
+          </a:bodyPr>
+          <a:lstStyle/>
+          <a:p>
+            <a:pPr marL="0" marR="0" lvl="0" indent="0" algn="ctr" defTabSz="914400" rtl="0" eaLnBrk="1" fontAlgn="auto" latinLnBrk="0" hangingPunct="1">
+              <a:lnSpc>
+                <a:spcPct val="100000"/>
+              </a:lnSpc>
+              <a:spcBef>
+                <a:spcPts val="0"/>
+              </a:spcBef>
+              <a:spcAft>
+                <a:spcPts val="500"/>
+              </a:spcAft>
+              <a:buClr>
+                <a:srgbClr val="000000"/>
+              </a:buClr>
+              <a:buSzTx/>
+              <a:buFont typeface="Arial"/>
+              <a:buNone/>
+              <a:tabLst/>
+              <a:defRPr/>
+            </a:pPr>
+            <a:r>
+              <a:rPr lang="en-US" sz="2000" dirty="0">
+                <a:solidFill>
+                  <a:schemeClr val="tx1"/>
+                </a:solidFill>
+                <a:ea typeface="Cascadia Mono SemiLight" panose="020B0609020000020004" pitchFamily="49" charset="0"/>
+                <a:cs typeface="Cascadia Mono SemiLight" panose="020B0609020000020004" pitchFamily="49" charset="0"/>
+              </a:rPr>
+              <a:t>1</a:t>
+            </a:r>
+            <a:endParaRPr kumimoji="0" lang="en-US" sz="2000" i="0" u="none" strike="noStrike" kern="0" cap="none" spc="0" normalizeH="0" baseline="0" noProof="0" dirty="0">
+              <a:ln>
+                <a:noFill/>
+              </a:ln>
+              <a:solidFill>
+                <a:schemeClr val="tx1"/>
+              </a:solidFill>
+              <a:effectLst/>
+              <a:uLnTx/>
+              <a:uFillTx/>
+              <a:latin typeface="Arial"/>
+              <a:ea typeface="Cascadia Mono SemiLight" panose="020B0609020000020004" pitchFamily="49" charset="0"/>
+              <a:cs typeface="Cascadia Mono SemiLight" panose="020B0609020000020004" pitchFamily="49" charset="0"/>
+              <a:sym typeface="Arial"/>
+            </a:endParaRPr>
+          </a:p>
+        </p:txBody>
+      </p:sp>
+      <p:cxnSp>
+        <p:nvCxnSpPr>
+          <p:cNvPr id="18" name="Google Shape;98;p1">
+            <a:extLst>
+              <a:ext uri="{FF2B5EF4-FFF2-40B4-BE49-F238E27FC236}">
+                <a16:creationId xmlns:a16="http://schemas.microsoft.com/office/drawing/2014/main" id="{1081D4A6-B13A-D419-5DE1-97540CC763C7}"/>
+              </a:ext>
+            </a:extLst>
+          </p:cNvPr>
+          <p:cNvCxnSpPr>
+            <a:cxnSpLocks/>
+          </p:cNvCxnSpPr>
+          <p:nvPr/>
+        </p:nvCxnSpPr>
+        <p:spPr>
+          <a:xfrm rot="5400000">
+            <a:off x="22062194" y="18882321"/>
+            <a:ext cx="0" cy="457200"/>
+          </a:xfrm>
+          <a:prstGeom prst="straightConnector1">
+            <a:avLst/>
+          </a:prstGeom>
+          <a:noFill/>
+          <a:ln w="12700" cap="flat" cmpd="sng">
+            <a:solidFill>
+              <a:schemeClr val="dk1"/>
+            </a:solidFill>
+            <a:prstDash val="solid"/>
+            <a:round/>
+            <a:headEnd type="none" w="sm" len="sm"/>
+            <a:tailEnd type="none" w="sm" len="sm"/>
+          </a:ln>
+          <a:effectLst>
+            <a:outerShdw blurRad="40000" dist="20000" dir="5400000" rotWithShape="0">
+              <a:srgbClr val="000000">
+                <a:alpha val="36470"/>
+              </a:srgbClr>
+            </a:outerShdw>
+          </a:effectLst>
+        </p:spPr>
+      </p:cxnSp>
     </p:spTree>
   </p:cSld>
   <p:clrMapOvr>

</xml_diff>